<commit_message>
updated MTM HRMS lib
</commit_message>
<xml_diff>
--- a/images/figures.pptx
+++ b/images/figures.pptx
@@ -4,8 +4,14 @@
   <p:sldMasterIdLst>
     <p:sldMasterId id="2147483648" r:id="rId1"/>
   </p:sldMasterIdLst>
+  <p:notesMasterIdLst>
+    <p:notesMasterId r:id="rId6"/>
+  </p:notesMasterIdLst>
   <p:sldIdLst>
     <p:sldId id="256" r:id="rId2"/>
+    <p:sldId id="257" r:id="rId3"/>
+    <p:sldId id="258" r:id="rId4"/>
+    <p:sldId id="259" r:id="rId5"/>
   </p:sldIdLst>
   <p:sldSz cx="12192000" cy="6858000"/>
   <p:notesSz cx="6858000" cy="9144000"/>
@@ -104,7 +110,446 @@
       </a:defRPr>
     </a:lvl9pPr>
   </p:defaultTextStyle>
+  <p:extLst>
+    <p:ext uri="{EFAFB233-063F-42B5-8137-9DF3F51BA10A}">
+      <p15:sldGuideLst xmlns:p15="http://schemas.microsoft.com/office/powerpoint/2012/main"/>
+    </p:ext>
+  </p:extLst>
 </p:presentation>
+</file>
+
+<file path=ppt/notesMasters/notesMaster1.xml><?xml version="1.0" encoding="utf-8"?>
+<p:notesMaster xmlns:a="http://schemas.openxmlformats.org/drawingml/2006/main" xmlns:r="http://schemas.openxmlformats.org/officeDocument/2006/relationships" xmlns:p="http://schemas.openxmlformats.org/presentationml/2006/main">
+  <p:cSld>
+    <p:bg>
+      <p:bgRef idx="1001">
+        <a:schemeClr val="bg1"/>
+      </p:bgRef>
+    </p:bg>
+    <p:spTree>
+      <p:nvGrpSpPr>
+        <p:cNvPr id="1" name=""/>
+        <p:cNvGrpSpPr/>
+        <p:nvPr/>
+      </p:nvGrpSpPr>
+      <p:grpSpPr>
+        <a:xfrm>
+          <a:off x="0" y="0"/>
+          <a:ext cx="0" cy="0"/>
+          <a:chOff x="0" y="0"/>
+          <a:chExt cx="0" cy="0"/>
+        </a:xfrm>
+      </p:grpSpPr>
+      <p:sp>
+        <p:nvSpPr>
+          <p:cNvPr id="2" name="Header Placeholder 1"/>
+          <p:cNvSpPr>
+            <a:spLocks noGrp="1"/>
+          </p:cNvSpPr>
+          <p:nvPr>
+            <p:ph type="hdr" sz="quarter"/>
+          </p:nvPr>
+        </p:nvSpPr>
+        <p:spPr>
+          <a:xfrm>
+            <a:off x="0" y="0"/>
+            <a:ext cx="2971800" cy="458788"/>
+          </a:xfrm>
+          <a:prstGeom prst="rect">
+            <a:avLst/>
+          </a:prstGeom>
+        </p:spPr>
+        <p:txBody>
+          <a:bodyPr vert="horz" lIns="91440" tIns="45720" rIns="91440" bIns="45720" rtlCol="0"/>
+          <a:lstStyle>
+            <a:lvl1pPr algn="l">
+              <a:defRPr sz="1200"/>
+            </a:lvl1pPr>
+          </a:lstStyle>
+          <a:p>
+            <a:endParaRPr lang="sv-SE"/>
+          </a:p>
+        </p:txBody>
+      </p:sp>
+      <p:sp>
+        <p:nvSpPr>
+          <p:cNvPr id="3" name="Date Placeholder 2"/>
+          <p:cNvSpPr>
+            <a:spLocks noGrp="1"/>
+          </p:cNvSpPr>
+          <p:nvPr>
+            <p:ph type="dt" idx="1"/>
+          </p:nvPr>
+        </p:nvSpPr>
+        <p:spPr>
+          <a:xfrm>
+            <a:off x="3884613" y="0"/>
+            <a:ext cx="2971800" cy="458788"/>
+          </a:xfrm>
+          <a:prstGeom prst="rect">
+            <a:avLst/>
+          </a:prstGeom>
+        </p:spPr>
+        <p:txBody>
+          <a:bodyPr vert="horz" lIns="91440" tIns="45720" rIns="91440" bIns="45720" rtlCol="0"/>
+          <a:lstStyle>
+            <a:lvl1pPr algn="r">
+              <a:defRPr sz="1200"/>
+            </a:lvl1pPr>
+          </a:lstStyle>
+          <a:p>
+            <a:fld id="{4217D5F8-6A3D-4B61-AF66-A6E7E18C4963}" type="datetimeFigureOut">
+              <a:rPr lang="sv-SE" smtClean="0"/>
+              <a:t>2021-05-24</a:t>
+            </a:fld>
+            <a:endParaRPr lang="sv-SE"/>
+          </a:p>
+        </p:txBody>
+      </p:sp>
+      <p:sp>
+        <p:nvSpPr>
+          <p:cNvPr id="4" name="Slide Image Placeholder 3"/>
+          <p:cNvSpPr>
+            <a:spLocks noGrp="1" noRot="1" noChangeAspect="1"/>
+          </p:cNvSpPr>
+          <p:nvPr>
+            <p:ph type="sldImg" idx="2"/>
+          </p:nvPr>
+        </p:nvSpPr>
+        <p:spPr>
+          <a:xfrm>
+            <a:off x="685800" y="1143000"/>
+            <a:ext cx="5486400" cy="3086100"/>
+          </a:xfrm>
+          <a:prstGeom prst="rect">
+            <a:avLst/>
+          </a:prstGeom>
+          <a:noFill/>
+          <a:ln w="12700">
+            <a:solidFill>
+              <a:prstClr val="black"/>
+            </a:solidFill>
+          </a:ln>
+        </p:spPr>
+        <p:txBody>
+          <a:bodyPr vert="horz" lIns="91440" tIns="45720" rIns="91440" bIns="45720" rtlCol="0" anchor="ctr"/>
+          <a:lstStyle/>
+          <a:p>
+            <a:endParaRPr lang="sv-SE"/>
+          </a:p>
+        </p:txBody>
+      </p:sp>
+      <p:sp>
+        <p:nvSpPr>
+          <p:cNvPr id="5" name="Notes Placeholder 4"/>
+          <p:cNvSpPr>
+            <a:spLocks noGrp="1"/>
+          </p:cNvSpPr>
+          <p:nvPr>
+            <p:ph type="body" sz="quarter" idx="3"/>
+          </p:nvPr>
+        </p:nvSpPr>
+        <p:spPr>
+          <a:xfrm>
+            <a:off x="685800" y="4400550"/>
+            <a:ext cx="5486400" cy="3600450"/>
+          </a:xfrm>
+          <a:prstGeom prst="rect">
+            <a:avLst/>
+          </a:prstGeom>
+        </p:spPr>
+        <p:txBody>
+          <a:bodyPr vert="horz" lIns="91440" tIns="45720" rIns="91440" bIns="45720" rtlCol="0"/>
+          <a:lstStyle/>
+          <a:p>
+            <a:pPr lvl="0"/>
+            <a:r>
+              <a:rPr lang="en-US"/>
+              <a:t>Click to edit Master text styles</a:t>
+            </a:r>
+          </a:p>
+          <a:p>
+            <a:pPr lvl="1"/>
+            <a:r>
+              <a:rPr lang="en-US"/>
+              <a:t>Second level</a:t>
+            </a:r>
+          </a:p>
+          <a:p>
+            <a:pPr lvl="2"/>
+            <a:r>
+              <a:rPr lang="en-US"/>
+              <a:t>Third level</a:t>
+            </a:r>
+          </a:p>
+          <a:p>
+            <a:pPr lvl="3"/>
+            <a:r>
+              <a:rPr lang="en-US"/>
+              <a:t>Fourth level</a:t>
+            </a:r>
+          </a:p>
+          <a:p>
+            <a:pPr lvl="4"/>
+            <a:r>
+              <a:rPr lang="en-US"/>
+              <a:t>Fifth level</a:t>
+            </a:r>
+            <a:endParaRPr lang="sv-SE"/>
+          </a:p>
+        </p:txBody>
+      </p:sp>
+      <p:sp>
+        <p:nvSpPr>
+          <p:cNvPr id="6" name="Footer Placeholder 5"/>
+          <p:cNvSpPr>
+            <a:spLocks noGrp="1"/>
+          </p:cNvSpPr>
+          <p:nvPr>
+            <p:ph type="ftr" sz="quarter" idx="4"/>
+          </p:nvPr>
+        </p:nvSpPr>
+        <p:spPr>
+          <a:xfrm>
+            <a:off x="0" y="8685213"/>
+            <a:ext cx="2971800" cy="458787"/>
+          </a:xfrm>
+          <a:prstGeom prst="rect">
+            <a:avLst/>
+          </a:prstGeom>
+        </p:spPr>
+        <p:txBody>
+          <a:bodyPr vert="horz" lIns="91440" tIns="45720" rIns="91440" bIns="45720" rtlCol="0" anchor="b"/>
+          <a:lstStyle>
+            <a:lvl1pPr algn="l">
+              <a:defRPr sz="1200"/>
+            </a:lvl1pPr>
+          </a:lstStyle>
+          <a:p>
+            <a:endParaRPr lang="sv-SE"/>
+          </a:p>
+        </p:txBody>
+      </p:sp>
+      <p:sp>
+        <p:nvSpPr>
+          <p:cNvPr id="7" name="Slide Number Placeholder 6"/>
+          <p:cNvSpPr>
+            <a:spLocks noGrp="1"/>
+          </p:cNvSpPr>
+          <p:nvPr>
+            <p:ph type="sldNum" sz="quarter" idx="5"/>
+          </p:nvPr>
+        </p:nvSpPr>
+        <p:spPr>
+          <a:xfrm>
+            <a:off x="3884613" y="8685213"/>
+            <a:ext cx="2971800" cy="458787"/>
+          </a:xfrm>
+          <a:prstGeom prst="rect">
+            <a:avLst/>
+          </a:prstGeom>
+        </p:spPr>
+        <p:txBody>
+          <a:bodyPr vert="horz" lIns="91440" tIns="45720" rIns="91440" bIns="45720" rtlCol="0" anchor="b"/>
+          <a:lstStyle>
+            <a:lvl1pPr algn="r">
+              <a:defRPr sz="1200"/>
+            </a:lvl1pPr>
+          </a:lstStyle>
+          <a:p>
+            <a:fld id="{54737E91-68ED-4FE4-A304-65796453F7E7}" type="slidenum">
+              <a:rPr lang="sv-SE" smtClean="0"/>
+              <a:t>‹#›</a:t>
+            </a:fld>
+            <a:endParaRPr lang="sv-SE"/>
+          </a:p>
+        </p:txBody>
+      </p:sp>
+    </p:spTree>
+    <p:extLst>
+      <p:ext uri="{BB962C8B-B14F-4D97-AF65-F5344CB8AC3E}">
+        <p14:creationId xmlns:p14="http://schemas.microsoft.com/office/powerpoint/2010/main" val="3520840171"/>
+      </p:ext>
+    </p:extLst>
+  </p:cSld>
+  <p:clrMap bg1="lt1" tx1="dk1" bg2="lt2" tx2="dk2" accent1="accent1" accent2="accent2" accent3="accent3" accent4="accent4" accent5="accent5" accent6="accent6" hlink="hlink" folHlink="folHlink"/>
+  <p:notesStyle>
+    <a:lvl1pPr marL="0" algn="l" defTabSz="914400" rtl="0" eaLnBrk="1" latinLnBrk="0" hangingPunct="1">
+      <a:defRPr sz="1200" kern="1200">
+        <a:solidFill>
+          <a:schemeClr val="tx1"/>
+        </a:solidFill>
+        <a:latin typeface="+mn-lt"/>
+        <a:ea typeface="+mn-ea"/>
+        <a:cs typeface="+mn-cs"/>
+      </a:defRPr>
+    </a:lvl1pPr>
+    <a:lvl2pPr marL="457200" algn="l" defTabSz="914400" rtl="0" eaLnBrk="1" latinLnBrk="0" hangingPunct="1">
+      <a:defRPr sz="1200" kern="1200">
+        <a:solidFill>
+          <a:schemeClr val="tx1"/>
+        </a:solidFill>
+        <a:latin typeface="+mn-lt"/>
+        <a:ea typeface="+mn-ea"/>
+        <a:cs typeface="+mn-cs"/>
+      </a:defRPr>
+    </a:lvl2pPr>
+    <a:lvl3pPr marL="914400" algn="l" defTabSz="914400" rtl="0" eaLnBrk="1" latinLnBrk="0" hangingPunct="1">
+      <a:defRPr sz="1200" kern="1200">
+        <a:solidFill>
+          <a:schemeClr val="tx1"/>
+        </a:solidFill>
+        <a:latin typeface="+mn-lt"/>
+        <a:ea typeface="+mn-ea"/>
+        <a:cs typeface="+mn-cs"/>
+      </a:defRPr>
+    </a:lvl3pPr>
+    <a:lvl4pPr marL="1371600" algn="l" defTabSz="914400" rtl="0" eaLnBrk="1" latinLnBrk="0" hangingPunct="1">
+      <a:defRPr sz="1200" kern="1200">
+        <a:solidFill>
+          <a:schemeClr val="tx1"/>
+        </a:solidFill>
+        <a:latin typeface="+mn-lt"/>
+        <a:ea typeface="+mn-ea"/>
+        <a:cs typeface="+mn-cs"/>
+      </a:defRPr>
+    </a:lvl4pPr>
+    <a:lvl5pPr marL="1828800" algn="l" defTabSz="914400" rtl="0" eaLnBrk="1" latinLnBrk="0" hangingPunct="1">
+      <a:defRPr sz="1200" kern="1200">
+        <a:solidFill>
+          <a:schemeClr val="tx1"/>
+        </a:solidFill>
+        <a:latin typeface="+mn-lt"/>
+        <a:ea typeface="+mn-ea"/>
+        <a:cs typeface="+mn-cs"/>
+      </a:defRPr>
+    </a:lvl5pPr>
+    <a:lvl6pPr marL="2286000" algn="l" defTabSz="914400" rtl="0" eaLnBrk="1" latinLnBrk="0" hangingPunct="1">
+      <a:defRPr sz="1200" kern="1200">
+        <a:solidFill>
+          <a:schemeClr val="tx1"/>
+        </a:solidFill>
+        <a:latin typeface="+mn-lt"/>
+        <a:ea typeface="+mn-ea"/>
+        <a:cs typeface="+mn-cs"/>
+      </a:defRPr>
+    </a:lvl6pPr>
+    <a:lvl7pPr marL="2743200" algn="l" defTabSz="914400" rtl="0" eaLnBrk="1" latinLnBrk="0" hangingPunct="1">
+      <a:defRPr sz="1200" kern="1200">
+        <a:solidFill>
+          <a:schemeClr val="tx1"/>
+        </a:solidFill>
+        <a:latin typeface="+mn-lt"/>
+        <a:ea typeface="+mn-ea"/>
+        <a:cs typeface="+mn-cs"/>
+      </a:defRPr>
+    </a:lvl7pPr>
+    <a:lvl8pPr marL="3200400" algn="l" defTabSz="914400" rtl="0" eaLnBrk="1" latinLnBrk="0" hangingPunct="1">
+      <a:defRPr sz="1200" kern="1200">
+        <a:solidFill>
+          <a:schemeClr val="tx1"/>
+        </a:solidFill>
+        <a:latin typeface="+mn-lt"/>
+        <a:ea typeface="+mn-ea"/>
+        <a:cs typeface="+mn-cs"/>
+      </a:defRPr>
+    </a:lvl8pPr>
+    <a:lvl9pPr marL="3657600" algn="l" defTabSz="914400" rtl="0" eaLnBrk="1" latinLnBrk="0" hangingPunct="1">
+      <a:defRPr sz="1200" kern="1200">
+        <a:solidFill>
+          <a:schemeClr val="tx1"/>
+        </a:solidFill>
+        <a:latin typeface="+mn-lt"/>
+        <a:ea typeface="+mn-ea"/>
+        <a:cs typeface="+mn-cs"/>
+      </a:defRPr>
+    </a:lvl9pPr>
+  </p:notesStyle>
+</p:notesMaster>
+</file>
+
+<file path=ppt/notesSlides/notesSlide1.xml><?xml version="1.0" encoding="utf-8"?>
+<p:notes xmlns:a="http://schemas.openxmlformats.org/drawingml/2006/main" xmlns:r="http://schemas.openxmlformats.org/officeDocument/2006/relationships" xmlns:p="http://schemas.openxmlformats.org/presentationml/2006/main">
+  <p:cSld>
+    <p:spTree>
+      <p:nvGrpSpPr>
+        <p:cNvPr id="1" name=""/>
+        <p:cNvGrpSpPr/>
+        <p:nvPr/>
+      </p:nvGrpSpPr>
+      <p:grpSpPr>
+        <a:xfrm>
+          <a:off x="0" y="0"/>
+          <a:ext cx="0" cy="0"/>
+          <a:chOff x="0" y="0"/>
+          <a:chExt cx="0" cy="0"/>
+        </a:xfrm>
+      </p:grpSpPr>
+      <p:sp>
+        <p:nvSpPr>
+          <p:cNvPr id="2" name="Slide Image Placeholder 1"/>
+          <p:cNvSpPr>
+            <a:spLocks noGrp="1" noRot="1" noChangeAspect="1"/>
+          </p:cNvSpPr>
+          <p:nvPr>
+            <p:ph type="sldImg"/>
+          </p:nvPr>
+        </p:nvSpPr>
+        <p:spPr/>
+      </p:sp>
+      <p:sp>
+        <p:nvSpPr>
+          <p:cNvPr id="3" name="Notes Placeholder 2"/>
+          <p:cNvSpPr>
+            <a:spLocks noGrp="1"/>
+          </p:cNvSpPr>
+          <p:nvPr>
+            <p:ph type="body" idx="1"/>
+          </p:nvPr>
+        </p:nvSpPr>
+        <p:spPr/>
+        <p:txBody>
+          <a:bodyPr/>
+          <a:lstStyle/>
+          <a:p>
+            <a:endParaRPr lang="sv-SE" dirty="0"/>
+          </a:p>
+        </p:txBody>
+      </p:sp>
+      <p:sp>
+        <p:nvSpPr>
+          <p:cNvPr id="4" name="Slide Number Placeholder 3"/>
+          <p:cNvSpPr>
+            <a:spLocks noGrp="1"/>
+          </p:cNvSpPr>
+          <p:nvPr>
+            <p:ph type="sldNum" sz="quarter" idx="5"/>
+          </p:nvPr>
+        </p:nvSpPr>
+        <p:spPr/>
+        <p:txBody>
+          <a:bodyPr/>
+          <a:lstStyle/>
+          <a:p>
+            <a:fld id="{54737E91-68ED-4FE4-A304-65796453F7E7}" type="slidenum">
+              <a:rPr lang="sv-SE" smtClean="0"/>
+              <a:t>2</a:t>
+            </a:fld>
+            <a:endParaRPr lang="sv-SE"/>
+          </a:p>
+        </p:txBody>
+      </p:sp>
+    </p:spTree>
+    <p:extLst>
+      <p:ext uri="{BB962C8B-B14F-4D97-AF65-F5344CB8AC3E}">
+        <p14:creationId xmlns:p14="http://schemas.microsoft.com/office/powerpoint/2010/main" val="2623400333"/>
+      </p:ext>
+    </p:extLst>
+  </p:cSld>
+  <p:clrMapOvr>
+    <a:masterClrMapping/>
+  </p:clrMapOvr>
+</p:notes>
 </file>
 
 <file path=ppt/slideLayouts/slideLayout1.xml><?xml version="1.0" encoding="utf-8"?>
@@ -254,7 +699,7 @@
           <a:p>
             <a:fld id="{D103641A-5BA2-451A-9886-04FF904A5C86}" type="datetimeFigureOut">
               <a:rPr lang="en-US" smtClean="0"/>
-              <a:t>9/7/2020</a:t>
+              <a:t>5/24/2021</a:t>
             </a:fld>
             <a:endParaRPr lang="en-US"/>
           </a:p>
@@ -452,7 +897,7 @@
           <a:p>
             <a:fld id="{D103641A-5BA2-451A-9886-04FF904A5C86}" type="datetimeFigureOut">
               <a:rPr lang="en-US" smtClean="0"/>
-              <a:t>9/7/2020</a:t>
+              <a:t>5/24/2021</a:t>
             </a:fld>
             <a:endParaRPr lang="en-US"/>
           </a:p>
@@ -660,7 +1105,7 @@
           <a:p>
             <a:fld id="{D103641A-5BA2-451A-9886-04FF904A5C86}" type="datetimeFigureOut">
               <a:rPr lang="en-US" smtClean="0"/>
-              <a:t>9/7/2020</a:t>
+              <a:t>5/24/2021</a:t>
             </a:fld>
             <a:endParaRPr lang="en-US"/>
           </a:p>
@@ -858,7 +1303,7 @@
           <a:p>
             <a:fld id="{D103641A-5BA2-451A-9886-04FF904A5C86}" type="datetimeFigureOut">
               <a:rPr lang="en-US" smtClean="0"/>
-              <a:t>9/7/2020</a:t>
+              <a:t>5/24/2021</a:t>
             </a:fld>
             <a:endParaRPr lang="en-US"/>
           </a:p>
@@ -1133,7 +1578,7 @@
           <a:p>
             <a:fld id="{D103641A-5BA2-451A-9886-04FF904A5C86}" type="datetimeFigureOut">
               <a:rPr lang="en-US" smtClean="0"/>
-              <a:t>9/7/2020</a:t>
+              <a:t>5/24/2021</a:t>
             </a:fld>
             <a:endParaRPr lang="en-US"/>
           </a:p>
@@ -1398,7 +1843,7 @@
           <a:p>
             <a:fld id="{D103641A-5BA2-451A-9886-04FF904A5C86}" type="datetimeFigureOut">
               <a:rPr lang="en-US" smtClean="0"/>
-              <a:t>9/7/2020</a:t>
+              <a:t>5/24/2021</a:t>
             </a:fld>
             <a:endParaRPr lang="en-US"/>
           </a:p>
@@ -1810,7 +2255,7 @@
           <a:p>
             <a:fld id="{D103641A-5BA2-451A-9886-04FF904A5C86}" type="datetimeFigureOut">
               <a:rPr lang="en-US" smtClean="0"/>
-              <a:t>9/7/2020</a:t>
+              <a:t>5/24/2021</a:t>
             </a:fld>
             <a:endParaRPr lang="en-US"/>
           </a:p>
@@ -1951,7 +2396,7 @@
           <a:p>
             <a:fld id="{D103641A-5BA2-451A-9886-04FF904A5C86}" type="datetimeFigureOut">
               <a:rPr lang="en-US" smtClean="0"/>
-              <a:t>9/7/2020</a:t>
+              <a:t>5/24/2021</a:t>
             </a:fld>
             <a:endParaRPr lang="en-US"/>
           </a:p>
@@ -2064,7 +2509,7 @@
           <a:p>
             <a:fld id="{D103641A-5BA2-451A-9886-04FF904A5C86}" type="datetimeFigureOut">
               <a:rPr lang="en-US" smtClean="0"/>
-              <a:t>9/7/2020</a:t>
+              <a:t>5/24/2021</a:t>
             </a:fld>
             <a:endParaRPr lang="en-US"/>
           </a:p>
@@ -2375,7 +2820,7 @@
           <a:p>
             <a:fld id="{D103641A-5BA2-451A-9886-04FF904A5C86}" type="datetimeFigureOut">
               <a:rPr lang="en-US" smtClean="0"/>
-              <a:t>9/7/2020</a:t>
+              <a:t>5/24/2021</a:t>
             </a:fld>
             <a:endParaRPr lang="en-US"/>
           </a:p>
@@ -2663,7 +3108,7 @@
           <a:p>
             <a:fld id="{D103641A-5BA2-451A-9886-04FF904A5C86}" type="datetimeFigureOut">
               <a:rPr lang="en-US" smtClean="0"/>
-              <a:t>9/7/2020</a:t>
+              <a:t>5/24/2021</a:t>
             </a:fld>
             <a:endParaRPr lang="en-US"/>
           </a:p>
@@ -2904,7 +3349,7 @@
           <a:p>
             <a:fld id="{D103641A-5BA2-451A-9886-04FF904A5C86}" type="datetimeFigureOut">
               <a:rPr lang="en-US" smtClean="0"/>
-              <a:t>9/7/2020</a:t>
+              <a:t>5/24/2021</a:t>
             </a:fld>
             <a:endParaRPr lang="en-US"/>
           </a:p>
@@ -3597,6 +4042,1315 @@
 </p:sld>
 </file>
 
+<file path=ppt/slides/slide2.xml><?xml version="1.0" encoding="utf-8"?>
+<p:sld xmlns:a="http://schemas.openxmlformats.org/drawingml/2006/main" xmlns:r="http://schemas.openxmlformats.org/officeDocument/2006/relationships" xmlns:p="http://schemas.openxmlformats.org/presentationml/2006/main">
+  <p:cSld>
+    <p:spTree>
+      <p:nvGrpSpPr>
+        <p:cNvPr id="1" name=""/>
+        <p:cNvGrpSpPr/>
+        <p:nvPr/>
+      </p:nvGrpSpPr>
+      <p:grpSpPr>
+        <a:xfrm>
+          <a:off x="0" y="0"/>
+          <a:ext cx="0" cy="0"/>
+          <a:chOff x="0" y="0"/>
+          <a:chExt cx="0" cy="0"/>
+        </a:xfrm>
+      </p:grpSpPr>
+      <p:pic>
+        <p:nvPicPr>
+          <p:cNvPr id="3" name="Picture 2">
+            <a:extLst>
+              <a:ext uri="{FF2B5EF4-FFF2-40B4-BE49-F238E27FC236}">
+                <a16:creationId xmlns:a16="http://schemas.microsoft.com/office/drawing/2014/main" id="{230F25F8-D237-44D7-9282-85D79D058D42}"/>
+              </a:ext>
+            </a:extLst>
+          </p:cNvPr>
+          <p:cNvPicPr>
+            <a:picLocks noChangeAspect="1"/>
+          </p:cNvPicPr>
+          <p:nvPr/>
+        </p:nvPicPr>
+        <p:blipFill>
+          <a:blip r:embed="rId3"/>
+          <a:stretch>
+            <a:fillRect/>
+          </a:stretch>
+        </p:blipFill>
+        <p:spPr>
+          <a:xfrm>
+            <a:off x="610295" y="0"/>
+            <a:ext cx="10971410" cy="6858000"/>
+          </a:xfrm>
+          <a:prstGeom prst="rect">
+            <a:avLst/>
+          </a:prstGeom>
+        </p:spPr>
+      </p:pic>
+      <p:sp>
+        <p:nvSpPr>
+          <p:cNvPr id="4" name="TextBox 3">
+            <a:extLst>
+              <a:ext uri="{FF2B5EF4-FFF2-40B4-BE49-F238E27FC236}">
+                <a16:creationId xmlns:a16="http://schemas.microsoft.com/office/drawing/2014/main" id="{1531603A-47A0-49E7-96D5-C351E998757E}"/>
+              </a:ext>
+            </a:extLst>
+          </p:cNvPr>
+          <p:cNvSpPr txBox="1"/>
+          <p:nvPr/>
+        </p:nvSpPr>
+        <p:spPr>
+          <a:xfrm>
+            <a:off x="2144699" y="622889"/>
+            <a:ext cx="433633" cy="369332"/>
+          </a:xfrm>
+          <a:prstGeom prst="rect">
+            <a:avLst/>
+          </a:prstGeom>
+          <a:solidFill>
+            <a:schemeClr val="bg1">
+              <a:alpha val="70000"/>
+            </a:schemeClr>
+          </a:solidFill>
+          <a:ln>
+            <a:solidFill>
+              <a:srgbClr val="FF0000"/>
+            </a:solidFill>
+          </a:ln>
+        </p:spPr>
+        <p:txBody>
+          <a:bodyPr wrap="square" rtlCol="0">
+            <a:spAutoFit/>
+          </a:bodyPr>
+          <a:lstStyle/>
+          <a:p>
+            <a:pPr algn="ctr"/>
+            <a:r>
+              <a:rPr lang="sv-SE" b="1" dirty="0"/>
+              <a:t>1</a:t>
+            </a:r>
+          </a:p>
+        </p:txBody>
+      </p:sp>
+      <p:cxnSp>
+        <p:nvCxnSpPr>
+          <p:cNvPr id="6" name="Straight Arrow Connector 5">
+            <a:extLst>
+              <a:ext uri="{FF2B5EF4-FFF2-40B4-BE49-F238E27FC236}">
+                <a16:creationId xmlns:a16="http://schemas.microsoft.com/office/drawing/2014/main" id="{DBCDC67F-B61F-4FAB-B92F-49554547EE51}"/>
+              </a:ext>
+            </a:extLst>
+          </p:cNvPr>
+          <p:cNvCxnSpPr>
+            <a:cxnSpLocks/>
+            <a:stCxn id="4" idx="1"/>
+          </p:cNvCxnSpPr>
+          <p:nvPr/>
+        </p:nvCxnSpPr>
+        <p:spPr>
+          <a:xfrm flipH="1">
+            <a:off x="1906623" y="807555"/>
+            <a:ext cx="238076" cy="320854"/>
+          </a:xfrm>
+          <a:prstGeom prst="straightConnector1">
+            <a:avLst/>
+          </a:prstGeom>
+          <a:ln w="38100">
+            <a:solidFill>
+              <a:srgbClr val="FF0000"/>
+            </a:solidFill>
+            <a:tailEnd type="triangle"/>
+          </a:ln>
+        </p:spPr>
+        <p:style>
+          <a:lnRef idx="1">
+            <a:schemeClr val="accent1"/>
+          </a:lnRef>
+          <a:fillRef idx="0">
+            <a:schemeClr val="accent1"/>
+          </a:fillRef>
+          <a:effectRef idx="0">
+            <a:schemeClr val="accent1"/>
+          </a:effectRef>
+          <a:fontRef idx="minor">
+            <a:schemeClr val="tx1"/>
+          </a:fontRef>
+        </p:style>
+      </p:cxnSp>
+      <p:sp>
+        <p:nvSpPr>
+          <p:cNvPr id="8" name="TextBox 7">
+            <a:extLst>
+              <a:ext uri="{FF2B5EF4-FFF2-40B4-BE49-F238E27FC236}">
+                <a16:creationId xmlns:a16="http://schemas.microsoft.com/office/drawing/2014/main" id="{850BEAEF-1090-4106-8188-05CE077418AE}"/>
+              </a:ext>
+            </a:extLst>
+          </p:cNvPr>
+          <p:cNvSpPr txBox="1"/>
+          <p:nvPr/>
+        </p:nvSpPr>
+        <p:spPr>
+          <a:xfrm>
+            <a:off x="5749916" y="3429000"/>
+            <a:ext cx="433633" cy="369332"/>
+          </a:xfrm>
+          <a:prstGeom prst="rect">
+            <a:avLst/>
+          </a:prstGeom>
+          <a:solidFill>
+            <a:schemeClr val="bg1">
+              <a:alpha val="70000"/>
+            </a:schemeClr>
+          </a:solidFill>
+          <a:ln>
+            <a:solidFill>
+              <a:srgbClr val="FF0000"/>
+            </a:solidFill>
+          </a:ln>
+        </p:spPr>
+        <p:txBody>
+          <a:bodyPr wrap="square" rtlCol="0">
+            <a:spAutoFit/>
+          </a:bodyPr>
+          <a:lstStyle/>
+          <a:p>
+            <a:pPr algn="ctr"/>
+            <a:r>
+              <a:rPr lang="sv-SE" b="1" dirty="0"/>
+              <a:t>2</a:t>
+            </a:r>
+          </a:p>
+        </p:txBody>
+      </p:sp>
+      <p:cxnSp>
+        <p:nvCxnSpPr>
+          <p:cNvPr id="9" name="Straight Arrow Connector 8">
+            <a:extLst>
+              <a:ext uri="{FF2B5EF4-FFF2-40B4-BE49-F238E27FC236}">
+                <a16:creationId xmlns:a16="http://schemas.microsoft.com/office/drawing/2014/main" id="{568E9C3A-CBD9-438C-9692-2F355893819A}"/>
+              </a:ext>
+            </a:extLst>
+          </p:cNvPr>
+          <p:cNvCxnSpPr>
+            <a:cxnSpLocks/>
+          </p:cNvCxnSpPr>
+          <p:nvPr/>
+        </p:nvCxnSpPr>
+        <p:spPr>
+          <a:xfrm flipH="1" flipV="1">
+            <a:off x="5369668" y="3171217"/>
+            <a:ext cx="380248" cy="471632"/>
+          </a:xfrm>
+          <a:prstGeom prst="straightConnector1">
+            <a:avLst/>
+          </a:prstGeom>
+          <a:ln w="38100">
+            <a:solidFill>
+              <a:srgbClr val="FF0000"/>
+            </a:solidFill>
+            <a:tailEnd type="triangle"/>
+          </a:ln>
+        </p:spPr>
+        <p:style>
+          <a:lnRef idx="1">
+            <a:schemeClr val="accent1"/>
+          </a:lnRef>
+          <a:fillRef idx="0">
+            <a:schemeClr val="accent1"/>
+          </a:fillRef>
+          <a:effectRef idx="0">
+            <a:schemeClr val="accent1"/>
+          </a:effectRef>
+          <a:fontRef idx="minor">
+            <a:schemeClr val="tx1"/>
+          </a:fontRef>
+        </p:style>
+      </p:cxnSp>
+      <p:sp>
+        <p:nvSpPr>
+          <p:cNvPr id="13" name="TextBox 12">
+            <a:extLst>
+              <a:ext uri="{FF2B5EF4-FFF2-40B4-BE49-F238E27FC236}">
+                <a16:creationId xmlns:a16="http://schemas.microsoft.com/office/drawing/2014/main" id="{5413748D-FB49-44DC-A993-9CA2908AA40F}"/>
+              </a:ext>
+            </a:extLst>
+          </p:cNvPr>
+          <p:cNvSpPr txBox="1"/>
+          <p:nvPr/>
+        </p:nvSpPr>
+        <p:spPr>
+          <a:xfrm>
+            <a:off x="5879183" y="5879481"/>
+            <a:ext cx="433633" cy="369332"/>
+          </a:xfrm>
+          <a:prstGeom prst="rect">
+            <a:avLst/>
+          </a:prstGeom>
+          <a:solidFill>
+            <a:schemeClr val="bg1">
+              <a:alpha val="70000"/>
+            </a:schemeClr>
+          </a:solidFill>
+          <a:ln>
+            <a:solidFill>
+              <a:srgbClr val="FF0000"/>
+            </a:solidFill>
+          </a:ln>
+        </p:spPr>
+        <p:txBody>
+          <a:bodyPr wrap="square" rtlCol="0">
+            <a:spAutoFit/>
+          </a:bodyPr>
+          <a:lstStyle/>
+          <a:p>
+            <a:pPr algn="ctr"/>
+            <a:r>
+              <a:rPr lang="sv-SE" b="1" dirty="0"/>
+              <a:t>3</a:t>
+            </a:r>
+          </a:p>
+        </p:txBody>
+      </p:sp>
+      <p:cxnSp>
+        <p:nvCxnSpPr>
+          <p:cNvPr id="14" name="Straight Arrow Connector 13">
+            <a:extLst>
+              <a:ext uri="{FF2B5EF4-FFF2-40B4-BE49-F238E27FC236}">
+                <a16:creationId xmlns:a16="http://schemas.microsoft.com/office/drawing/2014/main" id="{689B5A49-396B-42E9-BD98-6A4E360CA8CD}"/>
+              </a:ext>
+            </a:extLst>
+          </p:cNvPr>
+          <p:cNvCxnSpPr>
+            <a:cxnSpLocks/>
+          </p:cNvCxnSpPr>
+          <p:nvPr/>
+        </p:nvCxnSpPr>
+        <p:spPr>
+          <a:xfrm flipH="1">
+            <a:off x="5486400" y="6064147"/>
+            <a:ext cx="392784" cy="268559"/>
+          </a:xfrm>
+          <a:prstGeom prst="straightConnector1">
+            <a:avLst/>
+          </a:prstGeom>
+          <a:ln w="38100">
+            <a:solidFill>
+              <a:srgbClr val="FF0000"/>
+            </a:solidFill>
+            <a:tailEnd type="triangle"/>
+          </a:ln>
+        </p:spPr>
+        <p:style>
+          <a:lnRef idx="1">
+            <a:schemeClr val="accent1"/>
+          </a:lnRef>
+          <a:fillRef idx="0">
+            <a:schemeClr val="accent1"/>
+          </a:fillRef>
+          <a:effectRef idx="0">
+            <a:schemeClr val="accent1"/>
+          </a:effectRef>
+          <a:fontRef idx="minor">
+            <a:schemeClr val="tx1"/>
+          </a:fontRef>
+        </p:style>
+      </p:cxnSp>
+    </p:spTree>
+    <p:extLst>
+      <p:ext uri="{BB962C8B-B14F-4D97-AF65-F5344CB8AC3E}">
+        <p14:creationId xmlns:p14="http://schemas.microsoft.com/office/powerpoint/2010/main" val="749835149"/>
+      </p:ext>
+    </p:extLst>
+  </p:cSld>
+  <p:clrMapOvr>
+    <a:masterClrMapping/>
+  </p:clrMapOvr>
+</p:sld>
+</file>
+
+<file path=ppt/slides/slide3.xml><?xml version="1.0" encoding="utf-8"?>
+<p:sld xmlns:a="http://schemas.openxmlformats.org/drawingml/2006/main" xmlns:r="http://schemas.openxmlformats.org/officeDocument/2006/relationships" xmlns:p="http://schemas.openxmlformats.org/presentationml/2006/main">
+  <p:cSld>
+    <p:spTree>
+      <p:nvGrpSpPr>
+        <p:cNvPr id="1" name=""/>
+        <p:cNvGrpSpPr/>
+        <p:nvPr/>
+      </p:nvGrpSpPr>
+      <p:grpSpPr>
+        <a:xfrm>
+          <a:off x="0" y="0"/>
+          <a:ext cx="0" cy="0"/>
+          <a:chOff x="0" y="0"/>
+          <a:chExt cx="0" cy="0"/>
+        </a:xfrm>
+      </p:grpSpPr>
+      <p:pic>
+        <p:nvPicPr>
+          <p:cNvPr id="3" name="Picture 2">
+            <a:extLst>
+              <a:ext uri="{FF2B5EF4-FFF2-40B4-BE49-F238E27FC236}">
+                <a16:creationId xmlns:a16="http://schemas.microsoft.com/office/drawing/2014/main" id="{AA31ABC4-FBBD-468A-BC5B-E2FC5C350156}"/>
+              </a:ext>
+            </a:extLst>
+          </p:cNvPr>
+          <p:cNvPicPr>
+            <a:picLocks noChangeAspect="1"/>
+          </p:cNvPicPr>
+          <p:nvPr/>
+        </p:nvPicPr>
+        <p:blipFill rotWithShape="1">
+          <a:blip r:embed="rId2"/>
+          <a:srcRect l="27997"/>
+          <a:stretch/>
+        </p:blipFill>
+        <p:spPr>
+          <a:xfrm>
+            <a:off x="311273" y="0"/>
+            <a:ext cx="8202243" cy="6858000"/>
+          </a:xfrm>
+          <a:prstGeom prst="rect">
+            <a:avLst/>
+          </a:prstGeom>
+          <a:ln>
+            <a:solidFill>
+              <a:schemeClr val="tx1"/>
+            </a:solidFill>
+          </a:ln>
+        </p:spPr>
+      </p:pic>
+      <p:sp>
+        <p:nvSpPr>
+          <p:cNvPr id="4" name="TextBox 3">
+            <a:extLst>
+              <a:ext uri="{FF2B5EF4-FFF2-40B4-BE49-F238E27FC236}">
+                <a16:creationId xmlns:a16="http://schemas.microsoft.com/office/drawing/2014/main" id="{F019FA0F-E4C2-4F18-8948-539AFECBD070}"/>
+              </a:ext>
+            </a:extLst>
+          </p:cNvPr>
+          <p:cNvSpPr txBox="1"/>
+          <p:nvPr/>
+        </p:nvSpPr>
+        <p:spPr>
+          <a:xfrm>
+            <a:off x="2856241" y="2961182"/>
+            <a:ext cx="433633" cy="369332"/>
+          </a:xfrm>
+          <a:prstGeom prst="rect">
+            <a:avLst/>
+          </a:prstGeom>
+          <a:solidFill>
+            <a:schemeClr val="bg1">
+              <a:alpha val="70000"/>
+            </a:schemeClr>
+          </a:solidFill>
+          <a:ln>
+            <a:solidFill>
+              <a:srgbClr val="FF0000"/>
+            </a:solidFill>
+          </a:ln>
+        </p:spPr>
+        <p:txBody>
+          <a:bodyPr wrap="square" rtlCol="0">
+            <a:spAutoFit/>
+          </a:bodyPr>
+          <a:lstStyle/>
+          <a:p>
+            <a:pPr algn="ctr"/>
+            <a:r>
+              <a:rPr lang="sv-SE" b="1" dirty="0"/>
+              <a:t>4</a:t>
+            </a:r>
+          </a:p>
+        </p:txBody>
+      </p:sp>
+      <p:cxnSp>
+        <p:nvCxnSpPr>
+          <p:cNvPr id="5" name="Straight Arrow Connector 4">
+            <a:extLst>
+              <a:ext uri="{FF2B5EF4-FFF2-40B4-BE49-F238E27FC236}">
+                <a16:creationId xmlns:a16="http://schemas.microsoft.com/office/drawing/2014/main" id="{2F18A54A-889C-40CE-96F1-165E82BDB9EF}"/>
+              </a:ext>
+            </a:extLst>
+          </p:cNvPr>
+          <p:cNvCxnSpPr>
+            <a:cxnSpLocks/>
+          </p:cNvCxnSpPr>
+          <p:nvPr/>
+        </p:nvCxnSpPr>
+        <p:spPr>
+          <a:xfrm flipH="1" flipV="1">
+            <a:off x="2354082" y="2961182"/>
+            <a:ext cx="502159" cy="184666"/>
+          </a:xfrm>
+          <a:prstGeom prst="straightConnector1">
+            <a:avLst/>
+          </a:prstGeom>
+          <a:ln w="38100">
+            <a:solidFill>
+              <a:srgbClr val="FF0000"/>
+            </a:solidFill>
+            <a:tailEnd type="triangle"/>
+          </a:ln>
+        </p:spPr>
+        <p:style>
+          <a:lnRef idx="1">
+            <a:schemeClr val="accent1"/>
+          </a:lnRef>
+          <a:fillRef idx="0">
+            <a:schemeClr val="accent1"/>
+          </a:fillRef>
+          <a:effectRef idx="0">
+            <a:schemeClr val="accent1"/>
+          </a:effectRef>
+          <a:fontRef idx="minor">
+            <a:schemeClr val="tx1"/>
+          </a:fontRef>
+        </p:style>
+      </p:cxnSp>
+      <p:sp>
+        <p:nvSpPr>
+          <p:cNvPr id="8" name="TextBox 7">
+            <a:extLst>
+              <a:ext uri="{FF2B5EF4-FFF2-40B4-BE49-F238E27FC236}">
+                <a16:creationId xmlns:a16="http://schemas.microsoft.com/office/drawing/2014/main" id="{2B3942CD-B3A2-4824-83CD-9E46864F3A06}"/>
+              </a:ext>
+            </a:extLst>
+          </p:cNvPr>
+          <p:cNvSpPr txBox="1"/>
+          <p:nvPr/>
+        </p:nvSpPr>
+        <p:spPr>
+          <a:xfrm>
+            <a:off x="2600949" y="881769"/>
+            <a:ext cx="433633" cy="369332"/>
+          </a:xfrm>
+          <a:prstGeom prst="rect">
+            <a:avLst/>
+          </a:prstGeom>
+          <a:solidFill>
+            <a:schemeClr val="bg1">
+              <a:alpha val="70000"/>
+            </a:schemeClr>
+          </a:solidFill>
+          <a:ln>
+            <a:solidFill>
+              <a:srgbClr val="FF0000"/>
+            </a:solidFill>
+          </a:ln>
+        </p:spPr>
+        <p:txBody>
+          <a:bodyPr wrap="square" rtlCol="0">
+            <a:spAutoFit/>
+          </a:bodyPr>
+          <a:lstStyle/>
+          <a:p>
+            <a:pPr algn="ctr"/>
+            <a:r>
+              <a:rPr lang="sv-SE" b="1" dirty="0"/>
+              <a:t>5</a:t>
+            </a:r>
+          </a:p>
+        </p:txBody>
+      </p:sp>
+      <p:sp>
+        <p:nvSpPr>
+          <p:cNvPr id="9" name="TextBox 8">
+            <a:extLst>
+              <a:ext uri="{FF2B5EF4-FFF2-40B4-BE49-F238E27FC236}">
+                <a16:creationId xmlns:a16="http://schemas.microsoft.com/office/drawing/2014/main" id="{FE16FEFC-CBE2-48C3-9192-41C0A225A63E}"/>
+              </a:ext>
+            </a:extLst>
+          </p:cNvPr>
+          <p:cNvSpPr txBox="1"/>
+          <p:nvPr/>
+        </p:nvSpPr>
+        <p:spPr>
+          <a:xfrm>
+            <a:off x="6554910" y="3536004"/>
+            <a:ext cx="433633" cy="369332"/>
+          </a:xfrm>
+          <a:prstGeom prst="rect">
+            <a:avLst/>
+          </a:prstGeom>
+          <a:solidFill>
+            <a:schemeClr val="bg1">
+              <a:alpha val="70000"/>
+            </a:schemeClr>
+          </a:solidFill>
+          <a:ln>
+            <a:solidFill>
+              <a:srgbClr val="FF0000"/>
+            </a:solidFill>
+          </a:ln>
+        </p:spPr>
+        <p:txBody>
+          <a:bodyPr wrap="square" rtlCol="0">
+            <a:spAutoFit/>
+          </a:bodyPr>
+          <a:lstStyle/>
+          <a:p>
+            <a:pPr algn="ctr"/>
+            <a:r>
+              <a:rPr lang="sv-SE" b="1" dirty="0"/>
+              <a:t>6</a:t>
+            </a:r>
+          </a:p>
+        </p:txBody>
+      </p:sp>
+      <p:sp>
+        <p:nvSpPr>
+          <p:cNvPr id="10" name="TextBox 9">
+            <a:extLst>
+              <a:ext uri="{FF2B5EF4-FFF2-40B4-BE49-F238E27FC236}">
+                <a16:creationId xmlns:a16="http://schemas.microsoft.com/office/drawing/2014/main" id="{FB5BED8D-CAEF-4613-B8DE-201F11038B8C}"/>
+              </a:ext>
+            </a:extLst>
+          </p:cNvPr>
+          <p:cNvSpPr txBox="1"/>
+          <p:nvPr/>
+        </p:nvSpPr>
+        <p:spPr>
+          <a:xfrm>
+            <a:off x="7020548" y="818380"/>
+            <a:ext cx="433633" cy="369332"/>
+          </a:xfrm>
+          <a:prstGeom prst="rect">
+            <a:avLst/>
+          </a:prstGeom>
+          <a:solidFill>
+            <a:schemeClr val="bg1">
+              <a:alpha val="70000"/>
+            </a:schemeClr>
+          </a:solidFill>
+          <a:ln>
+            <a:solidFill>
+              <a:srgbClr val="FF0000"/>
+            </a:solidFill>
+          </a:ln>
+        </p:spPr>
+        <p:txBody>
+          <a:bodyPr wrap="square" rtlCol="0">
+            <a:spAutoFit/>
+          </a:bodyPr>
+          <a:lstStyle/>
+          <a:p>
+            <a:pPr algn="ctr"/>
+            <a:r>
+              <a:rPr lang="sv-SE" b="1" dirty="0"/>
+              <a:t>7</a:t>
+            </a:r>
+          </a:p>
+        </p:txBody>
+      </p:sp>
+      <p:pic>
+        <p:nvPicPr>
+          <p:cNvPr id="12" name="Picture 11">
+            <a:extLst>
+              <a:ext uri="{FF2B5EF4-FFF2-40B4-BE49-F238E27FC236}">
+                <a16:creationId xmlns:a16="http://schemas.microsoft.com/office/drawing/2014/main" id="{8A4BD5F3-C6AF-4CC0-AD7A-4A45EB425FCC}"/>
+              </a:ext>
+            </a:extLst>
+          </p:cNvPr>
+          <p:cNvPicPr>
+            <a:picLocks noChangeAspect="1"/>
+          </p:cNvPicPr>
+          <p:nvPr/>
+        </p:nvPicPr>
+        <p:blipFill>
+          <a:blip r:embed="rId3"/>
+          <a:stretch>
+            <a:fillRect/>
+          </a:stretch>
+        </p:blipFill>
+        <p:spPr>
+          <a:xfrm>
+            <a:off x="8725710" y="2236526"/>
+            <a:ext cx="3048506" cy="3905276"/>
+          </a:xfrm>
+          <a:prstGeom prst="rect">
+            <a:avLst/>
+          </a:prstGeom>
+          <a:ln>
+            <a:solidFill>
+              <a:schemeClr val="tx1"/>
+            </a:solidFill>
+          </a:ln>
+        </p:spPr>
+      </p:pic>
+      <p:cxnSp>
+        <p:nvCxnSpPr>
+          <p:cNvPr id="15" name="Straight Arrow Connector 14">
+            <a:extLst>
+              <a:ext uri="{FF2B5EF4-FFF2-40B4-BE49-F238E27FC236}">
+                <a16:creationId xmlns:a16="http://schemas.microsoft.com/office/drawing/2014/main" id="{2986004A-5603-43B2-A006-8E8E04BF5882}"/>
+              </a:ext>
+            </a:extLst>
+          </p:cNvPr>
+          <p:cNvCxnSpPr>
+            <a:cxnSpLocks/>
+          </p:cNvCxnSpPr>
+          <p:nvPr/>
+        </p:nvCxnSpPr>
+        <p:spPr>
+          <a:xfrm>
+            <a:off x="6767615" y="2519464"/>
+            <a:ext cx="2434751" cy="105670"/>
+          </a:xfrm>
+          <a:prstGeom prst="straightConnector1">
+            <a:avLst/>
+          </a:prstGeom>
+          <a:ln w="38100">
+            <a:solidFill>
+              <a:srgbClr val="FF0000"/>
+            </a:solidFill>
+            <a:tailEnd type="triangle"/>
+          </a:ln>
+        </p:spPr>
+        <p:style>
+          <a:lnRef idx="1">
+            <a:schemeClr val="accent1"/>
+          </a:lnRef>
+          <a:fillRef idx="0">
+            <a:schemeClr val="accent1"/>
+          </a:fillRef>
+          <a:effectRef idx="0">
+            <a:schemeClr val="accent1"/>
+          </a:effectRef>
+          <a:fontRef idx="minor">
+            <a:schemeClr val="tx1"/>
+          </a:fontRef>
+        </p:style>
+      </p:cxnSp>
+      <p:sp>
+        <p:nvSpPr>
+          <p:cNvPr id="19" name="TextBox 18">
+            <a:extLst>
+              <a:ext uri="{FF2B5EF4-FFF2-40B4-BE49-F238E27FC236}">
+                <a16:creationId xmlns:a16="http://schemas.microsoft.com/office/drawing/2014/main" id="{2DDF83A4-FEFD-47E0-8BB2-F36E4CD526EA}"/>
+              </a:ext>
+            </a:extLst>
+          </p:cNvPr>
+          <p:cNvSpPr txBox="1"/>
+          <p:nvPr/>
+        </p:nvSpPr>
+        <p:spPr>
+          <a:xfrm>
+            <a:off x="6331146" y="2255802"/>
+            <a:ext cx="433633" cy="369332"/>
+          </a:xfrm>
+          <a:prstGeom prst="rect">
+            <a:avLst/>
+          </a:prstGeom>
+          <a:solidFill>
+            <a:schemeClr val="bg1">
+              <a:alpha val="70000"/>
+            </a:schemeClr>
+          </a:solidFill>
+          <a:ln>
+            <a:solidFill>
+              <a:srgbClr val="FF0000"/>
+            </a:solidFill>
+          </a:ln>
+        </p:spPr>
+        <p:txBody>
+          <a:bodyPr wrap="square" rtlCol="0">
+            <a:spAutoFit/>
+          </a:bodyPr>
+          <a:lstStyle/>
+          <a:p>
+            <a:pPr algn="ctr"/>
+            <a:r>
+              <a:rPr lang="sv-SE" b="1" dirty="0"/>
+              <a:t>8</a:t>
+            </a:r>
+          </a:p>
+        </p:txBody>
+      </p:sp>
+      <p:sp>
+        <p:nvSpPr>
+          <p:cNvPr id="21" name="TextBox 20">
+            <a:extLst>
+              <a:ext uri="{FF2B5EF4-FFF2-40B4-BE49-F238E27FC236}">
+                <a16:creationId xmlns:a16="http://schemas.microsoft.com/office/drawing/2014/main" id="{08A1DEA1-0242-4B66-90A6-449FB22282B6}"/>
+              </a:ext>
+            </a:extLst>
+          </p:cNvPr>
+          <p:cNvSpPr txBox="1"/>
+          <p:nvPr/>
+        </p:nvSpPr>
+        <p:spPr>
+          <a:xfrm>
+            <a:off x="8902126" y="2776516"/>
+            <a:ext cx="433633" cy="369332"/>
+          </a:xfrm>
+          <a:prstGeom prst="rect">
+            <a:avLst/>
+          </a:prstGeom>
+          <a:solidFill>
+            <a:schemeClr val="bg1">
+              <a:alpha val="70000"/>
+            </a:schemeClr>
+          </a:solidFill>
+          <a:ln>
+            <a:solidFill>
+              <a:srgbClr val="FF0000"/>
+            </a:solidFill>
+          </a:ln>
+        </p:spPr>
+        <p:txBody>
+          <a:bodyPr wrap="square" rtlCol="0">
+            <a:spAutoFit/>
+          </a:bodyPr>
+          <a:lstStyle/>
+          <a:p>
+            <a:pPr algn="ctr"/>
+            <a:r>
+              <a:rPr lang="sv-SE" b="1" dirty="0"/>
+              <a:t>9</a:t>
+            </a:r>
+          </a:p>
+        </p:txBody>
+      </p:sp>
+      <p:sp>
+        <p:nvSpPr>
+          <p:cNvPr id="23" name="TextBox 22">
+            <a:extLst>
+              <a:ext uri="{FF2B5EF4-FFF2-40B4-BE49-F238E27FC236}">
+                <a16:creationId xmlns:a16="http://schemas.microsoft.com/office/drawing/2014/main" id="{A99C5C00-EFF4-4DC2-950A-5AF5C4C11FCD}"/>
+              </a:ext>
+            </a:extLst>
+          </p:cNvPr>
+          <p:cNvSpPr txBox="1"/>
+          <p:nvPr/>
+        </p:nvSpPr>
+        <p:spPr>
+          <a:xfrm>
+            <a:off x="6771726" y="2888020"/>
+            <a:ext cx="433633" cy="369332"/>
+          </a:xfrm>
+          <a:prstGeom prst="rect">
+            <a:avLst/>
+          </a:prstGeom>
+          <a:solidFill>
+            <a:schemeClr val="bg1">
+              <a:alpha val="70000"/>
+            </a:schemeClr>
+          </a:solidFill>
+          <a:ln>
+            <a:solidFill>
+              <a:srgbClr val="FF0000"/>
+            </a:solidFill>
+          </a:ln>
+        </p:spPr>
+        <p:txBody>
+          <a:bodyPr wrap="square" rtlCol="0">
+            <a:spAutoFit/>
+          </a:bodyPr>
+          <a:lstStyle/>
+          <a:p>
+            <a:pPr algn="ctr"/>
+            <a:r>
+              <a:rPr lang="sv-SE" b="1" dirty="0"/>
+              <a:t>10</a:t>
+            </a:r>
+          </a:p>
+        </p:txBody>
+      </p:sp>
+      <p:cxnSp>
+        <p:nvCxnSpPr>
+          <p:cNvPr id="25" name="Straight Arrow Connector 24">
+            <a:extLst>
+              <a:ext uri="{FF2B5EF4-FFF2-40B4-BE49-F238E27FC236}">
+                <a16:creationId xmlns:a16="http://schemas.microsoft.com/office/drawing/2014/main" id="{9B2A275D-2357-44FE-AF55-6C6690591657}"/>
+              </a:ext>
+            </a:extLst>
+          </p:cNvPr>
+          <p:cNvCxnSpPr>
+            <a:cxnSpLocks/>
+          </p:cNvCxnSpPr>
+          <p:nvPr/>
+        </p:nvCxnSpPr>
+        <p:spPr>
+          <a:xfrm flipH="1" flipV="1">
+            <a:off x="6554910" y="2888020"/>
+            <a:ext cx="209870" cy="184666"/>
+          </a:xfrm>
+          <a:prstGeom prst="straightConnector1">
+            <a:avLst/>
+          </a:prstGeom>
+          <a:ln w="38100">
+            <a:solidFill>
+              <a:srgbClr val="FF0000"/>
+            </a:solidFill>
+            <a:tailEnd type="triangle"/>
+          </a:ln>
+        </p:spPr>
+        <p:style>
+          <a:lnRef idx="1">
+            <a:schemeClr val="accent1"/>
+          </a:lnRef>
+          <a:fillRef idx="0">
+            <a:schemeClr val="accent1"/>
+          </a:fillRef>
+          <a:effectRef idx="0">
+            <a:schemeClr val="accent1"/>
+          </a:effectRef>
+          <a:fontRef idx="minor">
+            <a:schemeClr val="tx1"/>
+          </a:fontRef>
+        </p:style>
+      </p:cxnSp>
+    </p:spTree>
+    <p:extLst>
+      <p:ext uri="{BB962C8B-B14F-4D97-AF65-F5344CB8AC3E}">
+        <p14:creationId xmlns:p14="http://schemas.microsoft.com/office/powerpoint/2010/main" val="1642770577"/>
+      </p:ext>
+    </p:extLst>
+  </p:cSld>
+  <p:clrMapOvr>
+    <a:masterClrMapping/>
+  </p:clrMapOvr>
+</p:sld>
+</file>
+
+<file path=ppt/slides/slide4.xml><?xml version="1.0" encoding="utf-8"?>
+<p:sld xmlns:a="http://schemas.openxmlformats.org/drawingml/2006/main" xmlns:r="http://schemas.openxmlformats.org/officeDocument/2006/relationships" xmlns:p="http://schemas.openxmlformats.org/presentationml/2006/main">
+  <p:cSld>
+    <p:spTree>
+      <p:nvGrpSpPr>
+        <p:cNvPr id="1" name=""/>
+        <p:cNvGrpSpPr/>
+        <p:nvPr/>
+      </p:nvGrpSpPr>
+      <p:grpSpPr>
+        <a:xfrm>
+          <a:off x="0" y="0"/>
+          <a:ext cx="0" cy="0"/>
+          <a:chOff x="0" y="0"/>
+          <a:chExt cx="0" cy="0"/>
+        </a:xfrm>
+      </p:grpSpPr>
+      <p:pic>
+        <p:nvPicPr>
+          <p:cNvPr id="3" name="Picture 2">
+            <a:extLst>
+              <a:ext uri="{FF2B5EF4-FFF2-40B4-BE49-F238E27FC236}">
+                <a16:creationId xmlns:a16="http://schemas.microsoft.com/office/drawing/2014/main" id="{8D330DC8-2DC1-4620-A3F5-560111B5AA2F}"/>
+              </a:ext>
+            </a:extLst>
+          </p:cNvPr>
+          <p:cNvPicPr>
+            <a:picLocks noChangeAspect="1"/>
+          </p:cNvPicPr>
+          <p:nvPr/>
+        </p:nvPicPr>
+        <p:blipFill>
+          <a:blip r:embed="rId2"/>
+          <a:stretch>
+            <a:fillRect/>
+          </a:stretch>
+        </p:blipFill>
+        <p:spPr>
+          <a:xfrm>
+            <a:off x="0" y="148983"/>
+            <a:ext cx="12192000" cy="6560033"/>
+          </a:xfrm>
+          <a:prstGeom prst="rect">
+            <a:avLst/>
+          </a:prstGeom>
+        </p:spPr>
+      </p:pic>
+      <p:sp>
+        <p:nvSpPr>
+          <p:cNvPr id="4" name="TextBox 3">
+            <a:extLst>
+              <a:ext uri="{FF2B5EF4-FFF2-40B4-BE49-F238E27FC236}">
+                <a16:creationId xmlns:a16="http://schemas.microsoft.com/office/drawing/2014/main" id="{7A914FB3-CBAE-4117-B890-6E737F84C03D}"/>
+              </a:ext>
+            </a:extLst>
+          </p:cNvPr>
+          <p:cNvSpPr txBox="1"/>
+          <p:nvPr/>
+        </p:nvSpPr>
+        <p:spPr>
+          <a:xfrm>
+            <a:off x="0" y="3244333"/>
+            <a:ext cx="3393649" cy="2862322"/>
+          </a:xfrm>
+          <a:prstGeom prst="rect">
+            <a:avLst/>
+          </a:prstGeom>
+          <a:noFill/>
+          <a:ln w="19050">
+            <a:solidFill>
+              <a:srgbClr val="FF0000"/>
+            </a:solidFill>
+            <a:prstDash val="dash"/>
+          </a:ln>
+        </p:spPr>
+        <p:txBody>
+          <a:bodyPr wrap="square" rtlCol="0">
+            <a:spAutoFit/>
+          </a:bodyPr>
+          <a:lstStyle/>
+          <a:p>
+            <a:endParaRPr lang="sv-SE" dirty="0">
+              <a:solidFill>
+                <a:srgbClr val="FF0000"/>
+              </a:solidFill>
+            </a:endParaRPr>
+          </a:p>
+          <a:p>
+            <a:endParaRPr lang="sv-SE" dirty="0">
+              <a:solidFill>
+                <a:srgbClr val="FF0000"/>
+              </a:solidFill>
+            </a:endParaRPr>
+          </a:p>
+          <a:p>
+            <a:endParaRPr lang="sv-SE" dirty="0">
+              <a:solidFill>
+                <a:srgbClr val="FF0000"/>
+              </a:solidFill>
+            </a:endParaRPr>
+          </a:p>
+          <a:p>
+            <a:endParaRPr lang="sv-SE" dirty="0">
+              <a:solidFill>
+                <a:srgbClr val="FF0000"/>
+              </a:solidFill>
+            </a:endParaRPr>
+          </a:p>
+          <a:p>
+            <a:endParaRPr lang="sv-SE" dirty="0">
+              <a:solidFill>
+                <a:srgbClr val="FF0000"/>
+              </a:solidFill>
+            </a:endParaRPr>
+          </a:p>
+          <a:p>
+            <a:endParaRPr lang="sv-SE" dirty="0">
+              <a:solidFill>
+                <a:srgbClr val="FF0000"/>
+              </a:solidFill>
+            </a:endParaRPr>
+          </a:p>
+          <a:p>
+            <a:endParaRPr lang="sv-SE" dirty="0">
+              <a:solidFill>
+                <a:srgbClr val="FF0000"/>
+              </a:solidFill>
+            </a:endParaRPr>
+          </a:p>
+          <a:p>
+            <a:endParaRPr lang="sv-SE" dirty="0">
+              <a:solidFill>
+                <a:srgbClr val="FF0000"/>
+              </a:solidFill>
+            </a:endParaRPr>
+          </a:p>
+          <a:p>
+            <a:endParaRPr lang="sv-SE" dirty="0">
+              <a:solidFill>
+                <a:srgbClr val="FF0000"/>
+              </a:solidFill>
+            </a:endParaRPr>
+          </a:p>
+          <a:p>
+            <a:endParaRPr lang="sv-SE" dirty="0">
+              <a:solidFill>
+                <a:srgbClr val="FF0000"/>
+              </a:solidFill>
+            </a:endParaRPr>
+          </a:p>
+        </p:txBody>
+      </p:sp>
+      <p:cxnSp>
+        <p:nvCxnSpPr>
+          <p:cNvPr id="7" name="Straight Arrow Connector 6">
+            <a:extLst>
+              <a:ext uri="{FF2B5EF4-FFF2-40B4-BE49-F238E27FC236}">
+                <a16:creationId xmlns:a16="http://schemas.microsoft.com/office/drawing/2014/main" id="{BAAE52BE-ADB8-41A0-AF93-28F3ACF8DC73}"/>
+              </a:ext>
+            </a:extLst>
+          </p:cNvPr>
+          <p:cNvCxnSpPr>
+            <a:cxnSpLocks/>
+            <a:stCxn id="9" idx="0"/>
+          </p:cNvCxnSpPr>
+          <p:nvPr/>
+        </p:nvCxnSpPr>
+        <p:spPr>
+          <a:xfrm flipV="1">
+            <a:off x="402211" y="537328"/>
+            <a:ext cx="106836" cy="410911"/>
+          </a:xfrm>
+          <a:prstGeom prst="straightConnector1">
+            <a:avLst/>
+          </a:prstGeom>
+          <a:ln w="38100">
+            <a:solidFill>
+              <a:srgbClr val="FF0000"/>
+            </a:solidFill>
+            <a:tailEnd type="triangle"/>
+          </a:ln>
+        </p:spPr>
+        <p:style>
+          <a:lnRef idx="1">
+            <a:schemeClr val="accent1"/>
+          </a:lnRef>
+          <a:fillRef idx="0">
+            <a:schemeClr val="accent1"/>
+          </a:fillRef>
+          <a:effectRef idx="0">
+            <a:schemeClr val="accent1"/>
+          </a:effectRef>
+          <a:fontRef idx="minor">
+            <a:schemeClr val="tx1"/>
+          </a:fontRef>
+        </p:style>
+      </p:cxnSp>
+      <p:sp>
+        <p:nvSpPr>
+          <p:cNvPr id="9" name="TextBox 8">
+            <a:extLst>
+              <a:ext uri="{FF2B5EF4-FFF2-40B4-BE49-F238E27FC236}">
+                <a16:creationId xmlns:a16="http://schemas.microsoft.com/office/drawing/2014/main" id="{BA1FB876-4F53-4578-87E7-2354CDCC164A}"/>
+              </a:ext>
+            </a:extLst>
+          </p:cNvPr>
+          <p:cNvSpPr txBox="1"/>
+          <p:nvPr/>
+        </p:nvSpPr>
+        <p:spPr>
+          <a:xfrm>
+            <a:off x="185394" y="948239"/>
+            <a:ext cx="433633" cy="369332"/>
+          </a:xfrm>
+          <a:prstGeom prst="rect">
+            <a:avLst/>
+          </a:prstGeom>
+          <a:solidFill>
+            <a:schemeClr val="bg1">
+              <a:alpha val="70000"/>
+            </a:schemeClr>
+          </a:solidFill>
+          <a:ln>
+            <a:solidFill>
+              <a:srgbClr val="FF0000"/>
+            </a:solidFill>
+          </a:ln>
+        </p:spPr>
+        <p:txBody>
+          <a:bodyPr wrap="square" rtlCol="0">
+            <a:spAutoFit/>
+          </a:bodyPr>
+          <a:lstStyle/>
+          <a:p>
+            <a:pPr algn="ctr"/>
+            <a:r>
+              <a:rPr lang="sv-SE" b="1" dirty="0"/>
+              <a:t>11</a:t>
+            </a:r>
+          </a:p>
+        </p:txBody>
+      </p:sp>
+      <p:sp>
+        <p:nvSpPr>
+          <p:cNvPr id="10" name="TextBox 9">
+            <a:extLst>
+              <a:ext uri="{FF2B5EF4-FFF2-40B4-BE49-F238E27FC236}">
+                <a16:creationId xmlns:a16="http://schemas.microsoft.com/office/drawing/2014/main" id="{D6E7170C-9761-4F05-839F-A17C04D85A14}"/>
+              </a:ext>
+            </a:extLst>
+          </p:cNvPr>
+          <p:cNvSpPr txBox="1"/>
+          <p:nvPr/>
+        </p:nvSpPr>
+        <p:spPr>
+          <a:xfrm>
+            <a:off x="9293257" y="3391291"/>
+            <a:ext cx="433633" cy="369332"/>
+          </a:xfrm>
+          <a:prstGeom prst="rect">
+            <a:avLst/>
+          </a:prstGeom>
+          <a:solidFill>
+            <a:schemeClr val="bg1">
+              <a:alpha val="70000"/>
+            </a:schemeClr>
+          </a:solidFill>
+          <a:ln>
+            <a:solidFill>
+              <a:srgbClr val="FF0000"/>
+            </a:solidFill>
+          </a:ln>
+        </p:spPr>
+        <p:txBody>
+          <a:bodyPr wrap="square" rtlCol="0">
+            <a:spAutoFit/>
+          </a:bodyPr>
+          <a:lstStyle/>
+          <a:p>
+            <a:pPr algn="ctr"/>
+            <a:r>
+              <a:rPr lang="sv-SE" b="1" dirty="0"/>
+              <a:t>12</a:t>
+            </a:r>
+          </a:p>
+        </p:txBody>
+      </p:sp>
+      <p:sp>
+        <p:nvSpPr>
+          <p:cNvPr id="11" name="TextBox 10">
+            <a:extLst>
+              <a:ext uri="{FF2B5EF4-FFF2-40B4-BE49-F238E27FC236}">
+                <a16:creationId xmlns:a16="http://schemas.microsoft.com/office/drawing/2014/main" id="{6F3AEC86-E678-49D7-A5AF-A42615070661}"/>
+              </a:ext>
+            </a:extLst>
+          </p:cNvPr>
+          <p:cNvSpPr txBox="1"/>
+          <p:nvPr/>
+        </p:nvSpPr>
+        <p:spPr>
+          <a:xfrm>
+            <a:off x="1480007" y="948239"/>
+            <a:ext cx="433633" cy="369332"/>
+          </a:xfrm>
+          <a:prstGeom prst="rect">
+            <a:avLst/>
+          </a:prstGeom>
+          <a:solidFill>
+            <a:schemeClr val="bg1">
+              <a:alpha val="70000"/>
+            </a:schemeClr>
+          </a:solidFill>
+          <a:ln>
+            <a:solidFill>
+              <a:srgbClr val="FF0000"/>
+            </a:solidFill>
+          </a:ln>
+        </p:spPr>
+        <p:txBody>
+          <a:bodyPr wrap="square" rtlCol="0">
+            <a:spAutoFit/>
+          </a:bodyPr>
+          <a:lstStyle/>
+          <a:p>
+            <a:pPr algn="ctr"/>
+            <a:r>
+              <a:rPr lang="sv-SE" b="1" dirty="0"/>
+              <a:t>13</a:t>
+            </a:r>
+          </a:p>
+        </p:txBody>
+      </p:sp>
+      <p:cxnSp>
+        <p:nvCxnSpPr>
+          <p:cNvPr id="14" name="Straight Arrow Connector 13">
+            <a:extLst>
+              <a:ext uri="{FF2B5EF4-FFF2-40B4-BE49-F238E27FC236}">
+                <a16:creationId xmlns:a16="http://schemas.microsoft.com/office/drawing/2014/main" id="{84C65938-2B2B-4CF8-9DC6-25B529B0E4A9}"/>
+              </a:ext>
+            </a:extLst>
+          </p:cNvPr>
+          <p:cNvCxnSpPr>
+            <a:cxnSpLocks/>
+            <a:stCxn id="11" idx="0"/>
+          </p:cNvCxnSpPr>
+          <p:nvPr/>
+        </p:nvCxnSpPr>
+        <p:spPr>
+          <a:xfrm flipH="1" flipV="1">
+            <a:off x="1370028" y="537329"/>
+            <a:ext cx="326796" cy="410910"/>
+          </a:xfrm>
+          <a:prstGeom prst="straightConnector1">
+            <a:avLst/>
+          </a:prstGeom>
+          <a:ln w="38100">
+            <a:solidFill>
+              <a:srgbClr val="FF0000"/>
+            </a:solidFill>
+            <a:tailEnd type="triangle"/>
+          </a:ln>
+        </p:spPr>
+        <p:style>
+          <a:lnRef idx="1">
+            <a:schemeClr val="accent1"/>
+          </a:lnRef>
+          <a:fillRef idx="0">
+            <a:schemeClr val="accent1"/>
+          </a:fillRef>
+          <a:effectRef idx="0">
+            <a:schemeClr val="accent1"/>
+          </a:effectRef>
+          <a:fontRef idx="minor">
+            <a:schemeClr val="tx1"/>
+          </a:fontRef>
+        </p:style>
+      </p:cxnSp>
+      <p:sp>
+        <p:nvSpPr>
+          <p:cNvPr id="16" name="TextBox 15">
+            <a:extLst>
+              <a:ext uri="{FF2B5EF4-FFF2-40B4-BE49-F238E27FC236}">
+                <a16:creationId xmlns:a16="http://schemas.microsoft.com/office/drawing/2014/main" id="{AC83DC6F-6398-4887-B33A-E0D78FE11125}"/>
+              </a:ext>
+            </a:extLst>
+          </p:cNvPr>
+          <p:cNvSpPr txBox="1"/>
+          <p:nvPr/>
+        </p:nvSpPr>
+        <p:spPr>
+          <a:xfrm>
+            <a:off x="2248293" y="3271942"/>
+            <a:ext cx="433633" cy="369332"/>
+          </a:xfrm>
+          <a:prstGeom prst="rect">
+            <a:avLst/>
+          </a:prstGeom>
+          <a:solidFill>
+            <a:schemeClr val="bg1">
+              <a:alpha val="70000"/>
+            </a:schemeClr>
+          </a:solidFill>
+          <a:ln>
+            <a:solidFill>
+              <a:srgbClr val="FF0000"/>
+            </a:solidFill>
+          </a:ln>
+        </p:spPr>
+        <p:txBody>
+          <a:bodyPr wrap="square" rtlCol="0">
+            <a:spAutoFit/>
+          </a:bodyPr>
+          <a:lstStyle/>
+          <a:p>
+            <a:pPr algn="ctr"/>
+            <a:r>
+              <a:rPr lang="sv-SE" b="1" dirty="0"/>
+              <a:t>10</a:t>
+            </a:r>
+          </a:p>
+        </p:txBody>
+      </p:sp>
+    </p:spTree>
+    <p:extLst>
+      <p:ext uri="{BB962C8B-B14F-4D97-AF65-F5344CB8AC3E}">
+        <p14:creationId xmlns:p14="http://schemas.microsoft.com/office/powerpoint/2010/main" val="2951224244"/>
+      </p:ext>
+    </p:extLst>
+  </p:cSld>
+  <p:clrMapOvr>
+    <a:masterClrMapping/>
+  </p:clrMapOvr>
+</p:sld>
+</file>
+
 <file path=ppt/theme/theme1.xml><?xml version="1.0" encoding="utf-8"?>
 <a:theme xmlns:a="http://schemas.openxmlformats.org/drawingml/2006/main" name="Office Theme">
   <a:themeElements>
@@ -3890,4 +5644,299 @@
     </a:ext>
   </a:extLst>
 </a:theme>
+</file>
+
+<file path=ppt/theme/theme2.xml><?xml version="1.0" encoding="utf-8"?>
+<a:theme xmlns:a="http://schemas.openxmlformats.org/drawingml/2006/main" name="Office Theme">
+  <a:themeElements>
+    <a:clrScheme name="Office">
+      <a:dk1>
+        <a:sysClr val="windowText" lastClr="000000"/>
+      </a:dk1>
+      <a:lt1>
+        <a:sysClr val="window" lastClr="FFFFFF"/>
+      </a:lt1>
+      <a:dk2>
+        <a:srgbClr val="44546A"/>
+      </a:dk2>
+      <a:lt2>
+        <a:srgbClr val="E7E6E6"/>
+      </a:lt2>
+      <a:accent1>
+        <a:srgbClr val="4472C4"/>
+      </a:accent1>
+      <a:accent2>
+        <a:srgbClr val="ED7D31"/>
+      </a:accent2>
+      <a:accent3>
+        <a:srgbClr val="A5A5A5"/>
+      </a:accent3>
+      <a:accent4>
+        <a:srgbClr val="FFC000"/>
+      </a:accent4>
+      <a:accent5>
+        <a:srgbClr val="5B9BD5"/>
+      </a:accent5>
+      <a:accent6>
+        <a:srgbClr val="70AD47"/>
+      </a:accent6>
+      <a:hlink>
+        <a:srgbClr val="0563C1"/>
+      </a:hlink>
+      <a:folHlink>
+        <a:srgbClr val="954F72"/>
+      </a:folHlink>
+    </a:clrScheme>
+    <a:fontScheme name="Office">
+      <a:majorFont>
+        <a:latin typeface="Calibri Light" panose="020F0302020204030204"/>
+        <a:ea typeface=""/>
+        <a:cs typeface=""/>
+        <a:font script="Jpan" typeface="游ゴシック Light"/>
+        <a:font script="Hang" typeface="맑은 고딕"/>
+        <a:font script="Hans" typeface="等线 Light"/>
+        <a:font script="Hant" typeface="新細明體"/>
+        <a:font script="Arab" typeface="Times New Roman"/>
+        <a:font script="Hebr" typeface="Times New Roman"/>
+        <a:font script="Thai" typeface="Angsana New"/>
+        <a:font script="Ethi" typeface="Nyala"/>
+        <a:font script="Beng" typeface="Vrinda"/>
+        <a:font script="Gujr" typeface="Shruti"/>
+        <a:font script="Khmr" typeface="MoolBoran"/>
+        <a:font script="Knda" typeface="Tunga"/>
+        <a:font script="Guru" typeface="Raavi"/>
+        <a:font script="Cans" typeface="Euphemia"/>
+        <a:font script="Cher" typeface="Plantagenet Cherokee"/>
+        <a:font script="Yiii" typeface="Microsoft Yi Baiti"/>
+        <a:font script="Tibt" typeface="Microsoft Himalaya"/>
+        <a:font script="Thaa" typeface="MV Boli"/>
+        <a:font script="Deva" typeface="Mangal"/>
+        <a:font script="Telu" typeface="Gautami"/>
+        <a:font script="Taml" typeface="Latha"/>
+        <a:font script="Syrc" typeface="Estrangelo Edessa"/>
+        <a:font script="Orya" typeface="Kalinga"/>
+        <a:font script="Mlym" typeface="Kartika"/>
+        <a:font script="Laoo" typeface="DokChampa"/>
+        <a:font script="Sinh" typeface="Iskoola Pota"/>
+        <a:font script="Mong" typeface="Mongolian Baiti"/>
+        <a:font script="Viet" typeface="Times New Roman"/>
+        <a:font script="Uigh" typeface="Microsoft Uighur"/>
+        <a:font script="Geor" typeface="Sylfaen"/>
+        <a:font script="Armn" typeface="Arial"/>
+        <a:font script="Bugi" typeface="Leelawadee UI"/>
+        <a:font script="Bopo" typeface="Microsoft JhengHei"/>
+        <a:font script="Java" typeface="Javanese Text"/>
+        <a:font script="Lisu" typeface="Segoe UI"/>
+        <a:font script="Mymr" typeface="Myanmar Text"/>
+        <a:font script="Nkoo" typeface="Ebrima"/>
+        <a:font script="Olck" typeface="Nirmala UI"/>
+        <a:font script="Osma" typeface="Ebrima"/>
+        <a:font script="Phag" typeface="Phagspa"/>
+        <a:font script="Syrn" typeface="Estrangelo Edessa"/>
+        <a:font script="Syrj" typeface="Estrangelo Edessa"/>
+        <a:font script="Syre" typeface="Estrangelo Edessa"/>
+        <a:font script="Sora" typeface="Nirmala UI"/>
+        <a:font script="Tale" typeface="Microsoft Tai Le"/>
+        <a:font script="Talu" typeface="Microsoft New Tai Lue"/>
+        <a:font script="Tfng" typeface="Ebrima"/>
+      </a:majorFont>
+      <a:minorFont>
+        <a:latin typeface="Calibri" panose="020F0502020204030204"/>
+        <a:ea typeface=""/>
+        <a:cs typeface=""/>
+        <a:font script="Jpan" typeface="游ゴシック"/>
+        <a:font script="Hang" typeface="맑은 고딕"/>
+        <a:font script="Hans" typeface="等线"/>
+        <a:font script="Hant" typeface="新細明體"/>
+        <a:font script="Arab" typeface="Arial"/>
+        <a:font script="Hebr" typeface="Arial"/>
+        <a:font script="Thai" typeface="Cordia New"/>
+        <a:font script="Ethi" typeface="Nyala"/>
+        <a:font script="Beng" typeface="Vrinda"/>
+        <a:font script="Gujr" typeface="Shruti"/>
+        <a:font script="Khmr" typeface="DaunPenh"/>
+        <a:font script="Knda" typeface="Tunga"/>
+        <a:font script="Guru" typeface="Raavi"/>
+        <a:font script="Cans" typeface="Euphemia"/>
+        <a:font script="Cher" typeface="Plantagenet Cherokee"/>
+        <a:font script="Yiii" typeface="Microsoft Yi Baiti"/>
+        <a:font script="Tibt" typeface="Microsoft Himalaya"/>
+        <a:font script="Thaa" typeface="MV Boli"/>
+        <a:font script="Deva" typeface="Mangal"/>
+        <a:font script="Telu" typeface="Gautami"/>
+        <a:font script="Taml" typeface="Latha"/>
+        <a:font script="Syrc" typeface="Estrangelo Edessa"/>
+        <a:font script="Orya" typeface="Kalinga"/>
+        <a:font script="Mlym" typeface="Kartika"/>
+        <a:font script="Laoo" typeface="DokChampa"/>
+        <a:font script="Sinh" typeface="Iskoola Pota"/>
+        <a:font script="Mong" typeface="Mongolian Baiti"/>
+        <a:font script="Viet" typeface="Arial"/>
+        <a:font script="Uigh" typeface="Microsoft Uighur"/>
+        <a:font script="Geor" typeface="Sylfaen"/>
+        <a:font script="Armn" typeface="Arial"/>
+        <a:font script="Bugi" typeface="Leelawadee UI"/>
+        <a:font script="Bopo" typeface="Microsoft JhengHei"/>
+        <a:font script="Java" typeface="Javanese Text"/>
+        <a:font script="Lisu" typeface="Segoe UI"/>
+        <a:font script="Mymr" typeface="Myanmar Text"/>
+        <a:font script="Nkoo" typeface="Ebrima"/>
+        <a:font script="Olck" typeface="Nirmala UI"/>
+        <a:font script="Osma" typeface="Ebrima"/>
+        <a:font script="Phag" typeface="Phagspa"/>
+        <a:font script="Syrn" typeface="Estrangelo Edessa"/>
+        <a:font script="Syrj" typeface="Estrangelo Edessa"/>
+        <a:font script="Syre" typeface="Estrangelo Edessa"/>
+        <a:font script="Sora" typeface="Nirmala UI"/>
+        <a:font script="Tale" typeface="Microsoft Tai Le"/>
+        <a:font script="Talu" typeface="Microsoft New Tai Lue"/>
+        <a:font script="Tfng" typeface="Ebrima"/>
+      </a:minorFont>
+    </a:fontScheme>
+    <a:fmtScheme name="Office">
+      <a:fillStyleLst>
+        <a:solidFill>
+          <a:schemeClr val="phClr"/>
+        </a:solidFill>
+        <a:gradFill rotWithShape="1">
+          <a:gsLst>
+            <a:gs pos="0">
+              <a:schemeClr val="phClr">
+                <a:lumMod val="110000"/>
+                <a:satMod val="105000"/>
+                <a:tint val="67000"/>
+              </a:schemeClr>
+            </a:gs>
+            <a:gs pos="50000">
+              <a:schemeClr val="phClr">
+                <a:lumMod val="105000"/>
+                <a:satMod val="103000"/>
+                <a:tint val="73000"/>
+              </a:schemeClr>
+            </a:gs>
+            <a:gs pos="100000">
+              <a:schemeClr val="phClr">
+                <a:lumMod val="105000"/>
+                <a:satMod val="109000"/>
+                <a:tint val="81000"/>
+              </a:schemeClr>
+            </a:gs>
+          </a:gsLst>
+          <a:lin ang="5400000" scaled="0"/>
+        </a:gradFill>
+        <a:gradFill rotWithShape="1">
+          <a:gsLst>
+            <a:gs pos="0">
+              <a:schemeClr val="phClr">
+                <a:satMod val="103000"/>
+                <a:lumMod val="102000"/>
+                <a:tint val="94000"/>
+              </a:schemeClr>
+            </a:gs>
+            <a:gs pos="50000">
+              <a:schemeClr val="phClr">
+                <a:satMod val="110000"/>
+                <a:lumMod val="100000"/>
+                <a:shade val="100000"/>
+              </a:schemeClr>
+            </a:gs>
+            <a:gs pos="100000">
+              <a:schemeClr val="phClr">
+                <a:lumMod val="99000"/>
+                <a:satMod val="120000"/>
+                <a:shade val="78000"/>
+              </a:schemeClr>
+            </a:gs>
+          </a:gsLst>
+          <a:lin ang="5400000" scaled="0"/>
+        </a:gradFill>
+      </a:fillStyleLst>
+      <a:lnStyleLst>
+        <a:ln w="6350" cap="flat" cmpd="sng" algn="ctr">
+          <a:solidFill>
+            <a:schemeClr val="phClr"/>
+          </a:solidFill>
+          <a:prstDash val="solid"/>
+          <a:miter lim="800000"/>
+        </a:ln>
+        <a:ln w="12700" cap="flat" cmpd="sng" algn="ctr">
+          <a:solidFill>
+            <a:schemeClr val="phClr"/>
+          </a:solidFill>
+          <a:prstDash val="solid"/>
+          <a:miter lim="800000"/>
+        </a:ln>
+        <a:ln w="19050" cap="flat" cmpd="sng" algn="ctr">
+          <a:solidFill>
+            <a:schemeClr val="phClr"/>
+          </a:solidFill>
+          <a:prstDash val="solid"/>
+          <a:miter lim="800000"/>
+        </a:ln>
+      </a:lnStyleLst>
+      <a:effectStyleLst>
+        <a:effectStyle>
+          <a:effectLst/>
+        </a:effectStyle>
+        <a:effectStyle>
+          <a:effectLst/>
+        </a:effectStyle>
+        <a:effectStyle>
+          <a:effectLst>
+            <a:outerShdw blurRad="57150" dist="19050" dir="5400000" algn="ctr" rotWithShape="0">
+              <a:srgbClr val="000000">
+                <a:alpha val="63000"/>
+              </a:srgbClr>
+            </a:outerShdw>
+          </a:effectLst>
+        </a:effectStyle>
+      </a:effectStyleLst>
+      <a:bgFillStyleLst>
+        <a:solidFill>
+          <a:schemeClr val="phClr"/>
+        </a:solidFill>
+        <a:solidFill>
+          <a:schemeClr val="phClr">
+            <a:tint val="95000"/>
+            <a:satMod val="170000"/>
+          </a:schemeClr>
+        </a:solidFill>
+        <a:gradFill rotWithShape="1">
+          <a:gsLst>
+            <a:gs pos="0">
+              <a:schemeClr val="phClr">
+                <a:tint val="93000"/>
+                <a:satMod val="150000"/>
+                <a:shade val="98000"/>
+                <a:lumMod val="102000"/>
+              </a:schemeClr>
+            </a:gs>
+            <a:gs pos="50000">
+              <a:schemeClr val="phClr">
+                <a:tint val="98000"/>
+                <a:satMod val="130000"/>
+                <a:shade val="90000"/>
+                <a:lumMod val="103000"/>
+              </a:schemeClr>
+            </a:gs>
+            <a:gs pos="100000">
+              <a:schemeClr val="phClr">
+                <a:shade val="63000"/>
+                <a:satMod val="120000"/>
+              </a:schemeClr>
+            </a:gs>
+          </a:gsLst>
+          <a:lin ang="5400000" scaled="0"/>
+        </a:gradFill>
+      </a:bgFillStyleLst>
+    </a:fmtScheme>
+  </a:themeElements>
+  <a:objectDefaults/>
+  <a:extraClrSchemeLst/>
+  <a:extLst>
+    <a:ext uri="{05A4C25C-085E-4340-85A3-A5531E510DB2}">
+      <thm15:themeFamily xmlns:thm15="http://schemas.microsoft.com/office/thememl/2012/main" name="Office Theme" id="{62F939B6-93AF-4DB8-9C6B-D6C7DFDC589F}" vid="{4A3C46E8-61CC-4603-A589-7422A47A8E4A}"/>
+    </a:ext>
+  </a:extLst>
+</a:theme>
 </file>
</xml_diff>

<commit_message>
more tutorial for lib
</commit_message>
<xml_diff>
--- a/images/figures.pptx
+++ b/images/figures.pptx
@@ -5,13 +5,15 @@
     <p:sldMasterId id="2147483648" r:id="rId1"/>
   </p:sldMasterIdLst>
   <p:notesMasterIdLst>
-    <p:notesMasterId r:id="rId6"/>
+    <p:notesMasterId r:id="rId8"/>
   </p:notesMasterIdLst>
   <p:sldIdLst>
     <p:sldId id="256" r:id="rId2"/>
-    <p:sldId id="257" r:id="rId3"/>
-    <p:sldId id="258" r:id="rId4"/>
-    <p:sldId id="259" r:id="rId5"/>
+    <p:sldId id="260" r:id="rId3"/>
+    <p:sldId id="261" r:id="rId4"/>
+    <p:sldId id="257" r:id="rId5"/>
+    <p:sldId id="258" r:id="rId6"/>
+    <p:sldId id="259" r:id="rId7"/>
   </p:sldIdLst>
   <p:sldSz cx="12192000" cy="6858000"/>
   <p:notesSz cx="6858000" cy="9144000"/>
@@ -200,7 +202,7 @@
           <a:p>
             <a:fld id="{4217D5F8-6A3D-4B61-AF66-A6E7E18C4963}" type="datetimeFigureOut">
               <a:rPr lang="sv-SE" smtClean="0"/>
-              <a:t>2021-05-24</a:t>
+              <a:t>2021-06-03</a:t>
             </a:fld>
             <a:endParaRPr lang="sv-SE"/>
           </a:p>
@@ -533,7 +535,7 @@
           <a:p>
             <a:fld id="{54737E91-68ED-4FE4-A304-65796453F7E7}" type="slidenum">
               <a:rPr lang="sv-SE" smtClean="0"/>
-              <a:t>2</a:t>
+              <a:t>4</a:t>
             </a:fld>
             <a:endParaRPr lang="sv-SE"/>
           </a:p>
@@ -699,7 +701,7 @@
           <a:p>
             <a:fld id="{D103641A-5BA2-451A-9886-04FF904A5C86}" type="datetimeFigureOut">
               <a:rPr lang="en-US" smtClean="0"/>
-              <a:t>5/24/2021</a:t>
+              <a:t>6/3/2021</a:t>
             </a:fld>
             <a:endParaRPr lang="en-US"/>
           </a:p>
@@ -897,7 +899,7 @@
           <a:p>
             <a:fld id="{D103641A-5BA2-451A-9886-04FF904A5C86}" type="datetimeFigureOut">
               <a:rPr lang="en-US" smtClean="0"/>
-              <a:t>5/24/2021</a:t>
+              <a:t>6/3/2021</a:t>
             </a:fld>
             <a:endParaRPr lang="en-US"/>
           </a:p>
@@ -1105,7 +1107,7 @@
           <a:p>
             <a:fld id="{D103641A-5BA2-451A-9886-04FF904A5C86}" type="datetimeFigureOut">
               <a:rPr lang="en-US" smtClean="0"/>
-              <a:t>5/24/2021</a:t>
+              <a:t>6/3/2021</a:t>
             </a:fld>
             <a:endParaRPr lang="en-US"/>
           </a:p>
@@ -1303,7 +1305,7 @@
           <a:p>
             <a:fld id="{D103641A-5BA2-451A-9886-04FF904A5C86}" type="datetimeFigureOut">
               <a:rPr lang="en-US" smtClean="0"/>
-              <a:t>5/24/2021</a:t>
+              <a:t>6/3/2021</a:t>
             </a:fld>
             <a:endParaRPr lang="en-US"/>
           </a:p>
@@ -1578,7 +1580,7 @@
           <a:p>
             <a:fld id="{D103641A-5BA2-451A-9886-04FF904A5C86}" type="datetimeFigureOut">
               <a:rPr lang="en-US" smtClean="0"/>
-              <a:t>5/24/2021</a:t>
+              <a:t>6/3/2021</a:t>
             </a:fld>
             <a:endParaRPr lang="en-US"/>
           </a:p>
@@ -1843,7 +1845,7 @@
           <a:p>
             <a:fld id="{D103641A-5BA2-451A-9886-04FF904A5C86}" type="datetimeFigureOut">
               <a:rPr lang="en-US" smtClean="0"/>
-              <a:t>5/24/2021</a:t>
+              <a:t>6/3/2021</a:t>
             </a:fld>
             <a:endParaRPr lang="en-US"/>
           </a:p>
@@ -2255,7 +2257,7 @@
           <a:p>
             <a:fld id="{D103641A-5BA2-451A-9886-04FF904A5C86}" type="datetimeFigureOut">
               <a:rPr lang="en-US" smtClean="0"/>
-              <a:t>5/24/2021</a:t>
+              <a:t>6/3/2021</a:t>
             </a:fld>
             <a:endParaRPr lang="en-US"/>
           </a:p>
@@ -2396,7 +2398,7 @@
           <a:p>
             <a:fld id="{D103641A-5BA2-451A-9886-04FF904A5C86}" type="datetimeFigureOut">
               <a:rPr lang="en-US" smtClean="0"/>
-              <a:t>5/24/2021</a:t>
+              <a:t>6/3/2021</a:t>
             </a:fld>
             <a:endParaRPr lang="en-US"/>
           </a:p>
@@ -2509,7 +2511,7 @@
           <a:p>
             <a:fld id="{D103641A-5BA2-451A-9886-04FF904A5C86}" type="datetimeFigureOut">
               <a:rPr lang="en-US" smtClean="0"/>
-              <a:t>5/24/2021</a:t>
+              <a:t>6/3/2021</a:t>
             </a:fld>
             <a:endParaRPr lang="en-US"/>
           </a:p>
@@ -2820,7 +2822,7 @@
           <a:p>
             <a:fld id="{D103641A-5BA2-451A-9886-04FF904A5C86}" type="datetimeFigureOut">
               <a:rPr lang="en-US" smtClean="0"/>
-              <a:t>5/24/2021</a:t>
+              <a:t>6/3/2021</a:t>
             </a:fld>
             <a:endParaRPr lang="en-US"/>
           </a:p>
@@ -3108,7 +3110,7 @@
           <a:p>
             <a:fld id="{D103641A-5BA2-451A-9886-04FF904A5C86}" type="datetimeFigureOut">
               <a:rPr lang="en-US" smtClean="0"/>
-              <a:t>5/24/2021</a:t>
+              <a:t>6/3/2021</a:t>
             </a:fld>
             <a:endParaRPr lang="en-US"/>
           </a:p>
@@ -3349,7 +3351,7 @@
           <a:p>
             <a:fld id="{D103641A-5BA2-451A-9886-04FF904A5C86}" type="datetimeFigureOut">
               <a:rPr lang="en-US" smtClean="0"/>
-              <a:t>5/24/2021</a:t>
+              <a:t>6/3/2021</a:t>
             </a:fld>
             <a:endParaRPr lang="en-US"/>
           </a:p>
@@ -4059,6 +4061,900 @@
           <a:chExt cx="0" cy="0"/>
         </a:xfrm>
       </p:grpSpPr>
+    </p:spTree>
+    <p:extLst>
+      <p:ext uri="{BB962C8B-B14F-4D97-AF65-F5344CB8AC3E}">
+        <p14:creationId xmlns:p14="http://schemas.microsoft.com/office/powerpoint/2010/main" val="1167131846"/>
+      </p:ext>
+    </p:extLst>
+  </p:cSld>
+  <p:clrMapOvr>
+    <a:masterClrMapping/>
+  </p:clrMapOvr>
+</p:sld>
+</file>
+
+<file path=ppt/slides/slide3.xml><?xml version="1.0" encoding="utf-8"?>
+<p:sld xmlns:a="http://schemas.openxmlformats.org/drawingml/2006/main" xmlns:r="http://schemas.openxmlformats.org/officeDocument/2006/relationships" xmlns:p="http://schemas.openxmlformats.org/presentationml/2006/main">
+  <p:cSld>
+    <p:spTree>
+      <p:nvGrpSpPr>
+        <p:cNvPr id="1" name=""/>
+        <p:cNvGrpSpPr/>
+        <p:nvPr/>
+      </p:nvGrpSpPr>
+      <p:grpSpPr>
+        <a:xfrm>
+          <a:off x="0" y="0"/>
+          <a:ext cx="0" cy="0"/>
+          <a:chOff x="0" y="0"/>
+          <a:chExt cx="0" cy="0"/>
+        </a:xfrm>
+      </p:grpSpPr>
+      <p:pic>
+        <p:nvPicPr>
+          <p:cNvPr id="5" name="Picture 4">
+            <a:extLst>
+              <a:ext uri="{FF2B5EF4-FFF2-40B4-BE49-F238E27FC236}">
+                <a16:creationId xmlns:a16="http://schemas.microsoft.com/office/drawing/2014/main" id="{E2C1982F-EB3F-4162-88B9-0FF4E417E426}"/>
+              </a:ext>
+            </a:extLst>
+          </p:cNvPr>
+          <p:cNvPicPr>
+            <a:picLocks noChangeAspect="1"/>
+          </p:cNvPicPr>
+          <p:nvPr/>
+        </p:nvPicPr>
+        <p:blipFill rotWithShape="1">
+          <a:blip r:embed="rId2"/>
+          <a:srcRect l="20102" t="6756" r="42570"/>
+          <a:stretch/>
+        </p:blipFill>
+        <p:spPr>
+          <a:xfrm>
+            <a:off x="320387" y="651009"/>
+            <a:ext cx="2497361" cy="1849956"/>
+          </a:xfrm>
+          <a:prstGeom prst="rect">
+            <a:avLst/>
+          </a:prstGeom>
+          <a:ln>
+            <a:solidFill>
+              <a:schemeClr val="accent1"/>
+            </a:solidFill>
+          </a:ln>
+        </p:spPr>
+      </p:pic>
+      <p:sp>
+        <p:nvSpPr>
+          <p:cNvPr id="6" name="Arrow: Right 5">
+            <a:extLst>
+              <a:ext uri="{FF2B5EF4-FFF2-40B4-BE49-F238E27FC236}">
+                <a16:creationId xmlns:a16="http://schemas.microsoft.com/office/drawing/2014/main" id="{8B7A57B1-0AB7-4553-BEE0-DFF235D9BC14}"/>
+              </a:ext>
+            </a:extLst>
+          </p:cNvPr>
+          <p:cNvSpPr/>
+          <p:nvPr/>
+        </p:nvSpPr>
+        <p:spPr>
+          <a:xfrm>
+            <a:off x="2918543" y="1320123"/>
+            <a:ext cx="570451" cy="511728"/>
+          </a:xfrm>
+          <a:prstGeom prst="rightArrow">
+            <a:avLst/>
+          </a:prstGeom>
+        </p:spPr>
+        <p:style>
+          <a:lnRef idx="2">
+            <a:schemeClr val="accent1">
+              <a:shade val="50000"/>
+            </a:schemeClr>
+          </a:lnRef>
+          <a:fillRef idx="1">
+            <a:schemeClr val="accent1"/>
+          </a:fillRef>
+          <a:effectRef idx="0">
+            <a:schemeClr val="accent1"/>
+          </a:effectRef>
+          <a:fontRef idx="minor">
+            <a:schemeClr val="lt1"/>
+          </a:fontRef>
+        </p:style>
+        <p:txBody>
+          <a:bodyPr rtlCol="0" anchor="ctr"/>
+          <a:lstStyle/>
+          <a:p>
+            <a:pPr algn="ctr"/>
+            <a:endParaRPr lang="sv-SE"/>
+          </a:p>
+        </p:txBody>
+      </p:sp>
+      <p:pic>
+        <p:nvPicPr>
+          <p:cNvPr id="8" name="Picture 7">
+            <a:extLst>
+              <a:ext uri="{FF2B5EF4-FFF2-40B4-BE49-F238E27FC236}">
+                <a16:creationId xmlns:a16="http://schemas.microsoft.com/office/drawing/2014/main" id="{1130FE08-5FC9-45F4-AB61-891398180C46}"/>
+              </a:ext>
+            </a:extLst>
+          </p:cNvPr>
+          <p:cNvPicPr>
+            <a:picLocks noChangeAspect="1"/>
+          </p:cNvPicPr>
+          <p:nvPr/>
+        </p:nvPicPr>
+        <p:blipFill rotWithShape="1">
+          <a:blip r:embed="rId3"/>
+          <a:srcRect b="16159"/>
+          <a:stretch/>
+        </p:blipFill>
+        <p:spPr>
+          <a:xfrm>
+            <a:off x="3728451" y="535345"/>
+            <a:ext cx="2043173" cy="2470800"/>
+          </a:xfrm>
+          <a:prstGeom prst="rect">
+            <a:avLst/>
+          </a:prstGeom>
+          <a:ln>
+            <a:solidFill>
+              <a:schemeClr val="accent1"/>
+            </a:solidFill>
+          </a:ln>
+        </p:spPr>
+      </p:pic>
+      <p:sp>
+        <p:nvSpPr>
+          <p:cNvPr id="9" name="TextBox 8">
+            <a:extLst>
+              <a:ext uri="{FF2B5EF4-FFF2-40B4-BE49-F238E27FC236}">
+                <a16:creationId xmlns:a16="http://schemas.microsoft.com/office/drawing/2014/main" id="{E738B35D-1593-4734-ABC8-D4974D6640B1}"/>
+              </a:ext>
+            </a:extLst>
+          </p:cNvPr>
+          <p:cNvSpPr txBox="1"/>
+          <p:nvPr/>
+        </p:nvSpPr>
+        <p:spPr>
+          <a:xfrm>
+            <a:off x="1569067" y="782032"/>
+            <a:ext cx="1070222" cy="830997"/>
+          </a:xfrm>
+          <a:prstGeom prst="rect">
+            <a:avLst/>
+          </a:prstGeom>
+          <a:solidFill>
+            <a:schemeClr val="bg1"/>
+          </a:solidFill>
+          <a:ln>
+            <a:solidFill>
+              <a:schemeClr val="accent1"/>
+            </a:solidFill>
+          </a:ln>
+        </p:spPr>
+        <p:txBody>
+          <a:bodyPr wrap="square" rtlCol="0">
+            <a:spAutoFit/>
+          </a:bodyPr>
+          <a:lstStyle/>
+          <a:p>
+            <a:r>
+              <a:rPr lang="sv-SE" sz="1200" b="1" dirty="0"/>
+              <a:t>GC-HRMS </a:t>
+            </a:r>
+            <a:r>
+              <a:rPr lang="sv-SE" sz="1200" b="1" dirty="0" err="1"/>
+              <a:t>analysis</a:t>
+            </a:r>
+            <a:r>
+              <a:rPr lang="sv-SE" sz="1200" b="1" dirty="0"/>
+              <a:t> </a:t>
+            </a:r>
+            <a:r>
+              <a:rPr lang="sv-SE" sz="1200" b="1" dirty="0" err="1"/>
+              <a:t>of</a:t>
+            </a:r>
+            <a:r>
+              <a:rPr lang="sv-SE" sz="1200" b="1" dirty="0"/>
+              <a:t> </a:t>
+            </a:r>
+            <a:r>
+              <a:rPr lang="sv-SE" sz="1200" b="1" dirty="0" err="1"/>
+              <a:t>chloroatranol</a:t>
+            </a:r>
+            <a:r>
+              <a:rPr lang="sv-SE" sz="1200" b="1" dirty="0"/>
+              <a:t> standard</a:t>
+            </a:r>
+          </a:p>
+        </p:txBody>
+      </p:sp>
+      <p:sp>
+        <p:nvSpPr>
+          <p:cNvPr id="10" name="TextBox 9">
+            <a:extLst>
+              <a:ext uri="{FF2B5EF4-FFF2-40B4-BE49-F238E27FC236}">
+                <a16:creationId xmlns:a16="http://schemas.microsoft.com/office/drawing/2014/main" id="{5B3CFD18-593B-4B65-AB8A-55377EE144A5}"/>
+              </a:ext>
+            </a:extLst>
+          </p:cNvPr>
+          <p:cNvSpPr txBox="1"/>
+          <p:nvPr/>
+        </p:nvSpPr>
+        <p:spPr>
+          <a:xfrm>
+            <a:off x="4632992" y="651009"/>
+            <a:ext cx="922790" cy="276999"/>
+          </a:xfrm>
+          <a:prstGeom prst="rect">
+            <a:avLst/>
+          </a:prstGeom>
+          <a:noFill/>
+          <a:ln>
+            <a:solidFill>
+              <a:schemeClr val="accent1"/>
+            </a:solidFill>
+          </a:ln>
+        </p:spPr>
+        <p:txBody>
+          <a:bodyPr wrap="square" rtlCol="0">
+            <a:spAutoFit/>
+          </a:bodyPr>
+          <a:lstStyle/>
+          <a:p>
+            <a:r>
+              <a:rPr lang="sv-SE" sz="1200" b="1" dirty="0"/>
+              <a:t>Metainfo</a:t>
+            </a:r>
+          </a:p>
+        </p:txBody>
+      </p:sp>
+      <p:sp>
+        <p:nvSpPr>
+          <p:cNvPr id="11" name="TextBox 10">
+            <a:extLst>
+              <a:ext uri="{FF2B5EF4-FFF2-40B4-BE49-F238E27FC236}">
+                <a16:creationId xmlns:a16="http://schemas.microsoft.com/office/drawing/2014/main" id="{C6AB57E3-80E2-4C70-ABF1-71EE530D2725}"/>
+              </a:ext>
+            </a:extLst>
+          </p:cNvPr>
+          <p:cNvSpPr txBox="1"/>
+          <p:nvPr/>
+        </p:nvSpPr>
+        <p:spPr>
+          <a:xfrm>
+            <a:off x="4440744" y="1674688"/>
+            <a:ext cx="1115038" cy="276999"/>
+          </a:xfrm>
+          <a:prstGeom prst="rect">
+            <a:avLst/>
+          </a:prstGeom>
+          <a:noFill/>
+          <a:ln>
+            <a:solidFill>
+              <a:schemeClr val="accent1"/>
+            </a:solidFill>
+          </a:ln>
+        </p:spPr>
+        <p:txBody>
+          <a:bodyPr wrap="square" rtlCol="0">
+            <a:spAutoFit/>
+          </a:bodyPr>
+          <a:lstStyle/>
+          <a:p>
+            <a:r>
+              <a:rPr lang="sv-SE" sz="1200" b="1" dirty="0" err="1"/>
+              <a:t>Accurate</a:t>
+            </a:r>
+            <a:r>
+              <a:rPr lang="sv-SE" sz="1200" b="1" dirty="0"/>
+              <a:t> m/z </a:t>
+            </a:r>
+          </a:p>
+        </p:txBody>
+      </p:sp>
+      <p:sp>
+        <p:nvSpPr>
+          <p:cNvPr id="12" name="TextBox 11">
+            <a:extLst>
+              <a:ext uri="{FF2B5EF4-FFF2-40B4-BE49-F238E27FC236}">
+                <a16:creationId xmlns:a16="http://schemas.microsoft.com/office/drawing/2014/main" id="{FF757112-382C-4400-987A-4E914D6D3E27}"/>
+              </a:ext>
+            </a:extLst>
+          </p:cNvPr>
+          <p:cNvSpPr txBox="1"/>
+          <p:nvPr/>
+        </p:nvSpPr>
+        <p:spPr>
+          <a:xfrm>
+            <a:off x="4750036" y="2328016"/>
+            <a:ext cx="805745" cy="276999"/>
+          </a:xfrm>
+          <a:prstGeom prst="rect">
+            <a:avLst/>
+          </a:prstGeom>
+          <a:noFill/>
+          <a:ln>
+            <a:solidFill>
+              <a:schemeClr val="accent1"/>
+            </a:solidFill>
+          </a:ln>
+        </p:spPr>
+        <p:txBody>
+          <a:bodyPr wrap="square" rtlCol="0">
+            <a:spAutoFit/>
+          </a:bodyPr>
+          <a:lstStyle/>
+          <a:p>
+            <a:r>
+              <a:rPr lang="sv-SE" sz="1200" b="1" dirty="0" err="1"/>
+              <a:t>Intensity</a:t>
+            </a:r>
+            <a:endParaRPr lang="sv-SE" sz="1200" b="1" dirty="0"/>
+          </a:p>
+        </p:txBody>
+      </p:sp>
+      <p:cxnSp>
+        <p:nvCxnSpPr>
+          <p:cNvPr id="14" name="Straight Arrow Connector 13">
+            <a:extLst>
+              <a:ext uri="{FF2B5EF4-FFF2-40B4-BE49-F238E27FC236}">
+                <a16:creationId xmlns:a16="http://schemas.microsoft.com/office/drawing/2014/main" id="{006F837E-536E-47AF-A55C-575ACFECBD13}"/>
+              </a:ext>
+            </a:extLst>
+          </p:cNvPr>
+          <p:cNvCxnSpPr>
+            <a:cxnSpLocks/>
+            <a:stCxn id="11" idx="1"/>
+          </p:cNvCxnSpPr>
+          <p:nvPr/>
+        </p:nvCxnSpPr>
+        <p:spPr>
+          <a:xfrm flipH="1">
+            <a:off x="4051881" y="1813188"/>
+            <a:ext cx="388863" cy="321839"/>
+          </a:xfrm>
+          <a:prstGeom prst="straightConnector1">
+            <a:avLst/>
+          </a:prstGeom>
+          <a:ln>
+            <a:tailEnd type="triangle"/>
+          </a:ln>
+        </p:spPr>
+        <p:style>
+          <a:lnRef idx="1">
+            <a:schemeClr val="accent1"/>
+          </a:lnRef>
+          <a:fillRef idx="0">
+            <a:schemeClr val="accent1"/>
+          </a:fillRef>
+          <a:effectRef idx="0">
+            <a:schemeClr val="accent1"/>
+          </a:effectRef>
+          <a:fontRef idx="minor">
+            <a:schemeClr val="tx1"/>
+          </a:fontRef>
+        </p:style>
+      </p:cxnSp>
+      <p:cxnSp>
+        <p:nvCxnSpPr>
+          <p:cNvPr id="15" name="Straight Arrow Connector 14">
+            <a:extLst>
+              <a:ext uri="{FF2B5EF4-FFF2-40B4-BE49-F238E27FC236}">
+                <a16:creationId xmlns:a16="http://schemas.microsoft.com/office/drawing/2014/main" id="{70ED1FA4-B4FB-4700-B1FA-105DCACE911A}"/>
+              </a:ext>
+            </a:extLst>
+          </p:cNvPr>
+          <p:cNvCxnSpPr>
+            <a:cxnSpLocks/>
+            <a:stCxn id="12" idx="1"/>
+          </p:cNvCxnSpPr>
+          <p:nvPr/>
+        </p:nvCxnSpPr>
+        <p:spPr>
+          <a:xfrm flipH="1">
+            <a:off x="4440746" y="2466516"/>
+            <a:ext cx="309290" cy="92333"/>
+          </a:xfrm>
+          <a:prstGeom prst="straightConnector1">
+            <a:avLst/>
+          </a:prstGeom>
+          <a:ln>
+            <a:tailEnd type="triangle"/>
+          </a:ln>
+        </p:spPr>
+        <p:style>
+          <a:lnRef idx="1">
+            <a:schemeClr val="accent1"/>
+          </a:lnRef>
+          <a:fillRef idx="0">
+            <a:schemeClr val="accent1"/>
+          </a:fillRef>
+          <a:effectRef idx="0">
+            <a:schemeClr val="accent1"/>
+          </a:effectRef>
+          <a:fontRef idx="minor">
+            <a:schemeClr val="tx1"/>
+          </a:fontRef>
+        </p:style>
+      </p:cxnSp>
+      <p:pic>
+        <p:nvPicPr>
+          <p:cNvPr id="20" name="Picture 19">
+            <a:extLst>
+              <a:ext uri="{FF2B5EF4-FFF2-40B4-BE49-F238E27FC236}">
+                <a16:creationId xmlns:a16="http://schemas.microsoft.com/office/drawing/2014/main" id="{7576AF11-1EDF-4001-95D0-9578E1B65EDE}"/>
+              </a:ext>
+            </a:extLst>
+          </p:cNvPr>
+          <p:cNvPicPr>
+            <a:picLocks noChangeAspect="1"/>
+          </p:cNvPicPr>
+          <p:nvPr/>
+        </p:nvPicPr>
+        <p:blipFill rotWithShape="1">
+          <a:blip r:embed="rId4"/>
+          <a:srcRect t="3108"/>
+          <a:stretch/>
+        </p:blipFill>
+        <p:spPr>
+          <a:xfrm>
+            <a:off x="309602" y="4058558"/>
+            <a:ext cx="2508146" cy="1849956"/>
+          </a:xfrm>
+          <a:prstGeom prst="rect">
+            <a:avLst/>
+          </a:prstGeom>
+          <a:ln>
+            <a:solidFill>
+              <a:schemeClr val="accent1"/>
+            </a:solidFill>
+          </a:ln>
+        </p:spPr>
+      </p:pic>
+      <p:sp>
+        <p:nvSpPr>
+          <p:cNvPr id="21" name="TextBox 20">
+            <a:extLst>
+              <a:ext uri="{FF2B5EF4-FFF2-40B4-BE49-F238E27FC236}">
+                <a16:creationId xmlns:a16="http://schemas.microsoft.com/office/drawing/2014/main" id="{8E7BCB21-E14A-4307-AE5E-7FB7B61B188D}"/>
+              </a:ext>
+            </a:extLst>
+          </p:cNvPr>
+          <p:cNvSpPr txBox="1"/>
+          <p:nvPr/>
+        </p:nvSpPr>
+        <p:spPr>
+          <a:xfrm>
+            <a:off x="376833" y="4152539"/>
+            <a:ext cx="1070222" cy="830997"/>
+          </a:xfrm>
+          <a:prstGeom prst="rect">
+            <a:avLst/>
+          </a:prstGeom>
+          <a:solidFill>
+            <a:schemeClr val="bg1"/>
+          </a:solidFill>
+          <a:ln>
+            <a:solidFill>
+              <a:schemeClr val="accent1"/>
+            </a:solidFill>
+          </a:ln>
+        </p:spPr>
+        <p:txBody>
+          <a:bodyPr wrap="square" rtlCol="0">
+            <a:spAutoFit/>
+          </a:bodyPr>
+          <a:lstStyle/>
+          <a:p>
+            <a:r>
+              <a:rPr lang="sv-SE" sz="1200" b="1" dirty="0"/>
+              <a:t>GC-HRMS </a:t>
+            </a:r>
+            <a:r>
+              <a:rPr lang="sv-SE" sz="1200" b="1" dirty="0" err="1"/>
+              <a:t>analysis</a:t>
+            </a:r>
+            <a:r>
+              <a:rPr lang="sv-SE" sz="1200" b="1" dirty="0"/>
+              <a:t> </a:t>
+            </a:r>
+            <a:r>
+              <a:rPr lang="sv-SE" sz="1200" b="1" dirty="0" err="1"/>
+              <a:t>of</a:t>
+            </a:r>
+            <a:r>
+              <a:rPr lang="sv-SE" sz="1200" b="1" dirty="0"/>
+              <a:t> LCM-4 standard</a:t>
+            </a:r>
+          </a:p>
+        </p:txBody>
+      </p:sp>
+      <p:sp>
+        <p:nvSpPr>
+          <p:cNvPr id="27" name="Arrow: Right 26">
+            <a:extLst>
+              <a:ext uri="{FF2B5EF4-FFF2-40B4-BE49-F238E27FC236}">
+                <a16:creationId xmlns:a16="http://schemas.microsoft.com/office/drawing/2014/main" id="{31039317-915C-4B08-A185-9809CF9C8365}"/>
+              </a:ext>
+            </a:extLst>
+          </p:cNvPr>
+          <p:cNvSpPr/>
+          <p:nvPr/>
+        </p:nvSpPr>
+        <p:spPr>
+          <a:xfrm>
+            <a:off x="2918543" y="4727672"/>
+            <a:ext cx="570451" cy="511728"/>
+          </a:xfrm>
+          <a:prstGeom prst="rightArrow">
+            <a:avLst/>
+          </a:prstGeom>
+        </p:spPr>
+        <p:style>
+          <a:lnRef idx="2">
+            <a:schemeClr val="accent1">
+              <a:shade val="50000"/>
+            </a:schemeClr>
+          </a:lnRef>
+          <a:fillRef idx="1">
+            <a:schemeClr val="accent1"/>
+          </a:fillRef>
+          <a:effectRef idx="0">
+            <a:schemeClr val="accent1"/>
+          </a:effectRef>
+          <a:fontRef idx="minor">
+            <a:schemeClr val="lt1"/>
+          </a:fontRef>
+        </p:style>
+        <p:txBody>
+          <a:bodyPr rtlCol="0" anchor="ctr"/>
+          <a:lstStyle/>
+          <a:p>
+            <a:pPr algn="ctr"/>
+            <a:endParaRPr lang="sv-SE"/>
+          </a:p>
+        </p:txBody>
+      </p:sp>
+      <p:pic>
+        <p:nvPicPr>
+          <p:cNvPr id="29" name="Picture 28">
+            <a:extLst>
+              <a:ext uri="{FF2B5EF4-FFF2-40B4-BE49-F238E27FC236}">
+                <a16:creationId xmlns:a16="http://schemas.microsoft.com/office/drawing/2014/main" id="{1DD838E1-C353-4497-9E36-A203ADD4D857}"/>
+              </a:ext>
+            </a:extLst>
+          </p:cNvPr>
+          <p:cNvPicPr>
+            <a:picLocks noChangeAspect="1"/>
+          </p:cNvPicPr>
+          <p:nvPr/>
+        </p:nvPicPr>
+        <p:blipFill>
+          <a:blip r:embed="rId5"/>
+          <a:stretch>
+            <a:fillRect/>
+          </a:stretch>
+        </p:blipFill>
+        <p:spPr>
+          <a:xfrm>
+            <a:off x="3712300" y="3520974"/>
+            <a:ext cx="2075472" cy="2470800"/>
+          </a:xfrm>
+          <a:prstGeom prst="rect">
+            <a:avLst/>
+          </a:prstGeom>
+          <a:ln>
+            <a:solidFill>
+              <a:schemeClr val="accent1"/>
+            </a:solidFill>
+          </a:ln>
+        </p:spPr>
+      </p:pic>
+      <p:sp>
+        <p:nvSpPr>
+          <p:cNvPr id="30" name="Arrow: Right 29">
+            <a:extLst>
+              <a:ext uri="{FF2B5EF4-FFF2-40B4-BE49-F238E27FC236}">
+                <a16:creationId xmlns:a16="http://schemas.microsoft.com/office/drawing/2014/main" id="{86DA9541-B788-4122-8AEC-C60D10447DAC}"/>
+              </a:ext>
+            </a:extLst>
+          </p:cNvPr>
+          <p:cNvSpPr/>
+          <p:nvPr/>
+        </p:nvSpPr>
+        <p:spPr>
+          <a:xfrm rot="20270422">
+            <a:off x="5974993" y="3921384"/>
+            <a:ext cx="858473" cy="503339"/>
+          </a:xfrm>
+          <a:prstGeom prst="rightArrow">
+            <a:avLst/>
+          </a:prstGeom>
+        </p:spPr>
+        <p:style>
+          <a:lnRef idx="2">
+            <a:schemeClr val="accent1">
+              <a:shade val="50000"/>
+            </a:schemeClr>
+          </a:lnRef>
+          <a:fillRef idx="1">
+            <a:schemeClr val="accent1"/>
+          </a:fillRef>
+          <a:effectRef idx="0">
+            <a:schemeClr val="accent1"/>
+          </a:effectRef>
+          <a:fontRef idx="minor">
+            <a:schemeClr val="lt1"/>
+          </a:fontRef>
+        </p:style>
+        <p:txBody>
+          <a:bodyPr rtlCol="0" anchor="ctr"/>
+          <a:lstStyle/>
+          <a:p>
+            <a:pPr algn="ctr"/>
+            <a:endParaRPr lang="sv-SE"/>
+          </a:p>
+        </p:txBody>
+      </p:sp>
+      <p:sp>
+        <p:nvSpPr>
+          <p:cNvPr id="31" name="Arrow: Right 30">
+            <a:extLst>
+              <a:ext uri="{FF2B5EF4-FFF2-40B4-BE49-F238E27FC236}">
+                <a16:creationId xmlns:a16="http://schemas.microsoft.com/office/drawing/2014/main" id="{5528C216-6EE4-4570-8489-66B2DE94DCA6}"/>
+              </a:ext>
+            </a:extLst>
+          </p:cNvPr>
+          <p:cNvSpPr/>
+          <p:nvPr/>
+        </p:nvSpPr>
+        <p:spPr>
+          <a:xfrm rot="1650898">
+            <a:off x="5970267" y="1620282"/>
+            <a:ext cx="858473" cy="503339"/>
+          </a:xfrm>
+          <a:prstGeom prst="rightArrow">
+            <a:avLst/>
+          </a:prstGeom>
+        </p:spPr>
+        <p:style>
+          <a:lnRef idx="2">
+            <a:schemeClr val="accent1">
+              <a:shade val="50000"/>
+            </a:schemeClr>
+          </a:lnRef>
+          <a:fillRef idx="1">
+            <a:schemeClr val="accent1"/>
+          </a:fillRef>
+          <a:effectRef idx="0">
+            <a:schemeClr val="accent1"/>
+          </a:effectRef>
+          <a:fontRef idx="minor">
+            <a:schemeClr val="lt1"/>
+          </a:fontRef>
+        </p:style>
+        <p:txBody>
+          <a:bodyPr rtlCol="0" anchor="ctr"/>
+          <a:lstStyle/>
+          <a:p>
+            <a:pPr algn="ctr"/>
+            <a:endParaRPr lang="sv-SE" dirty="0"/>
+          </a:p>
+        </p:txBody>
+      </p:sp>
+      <p:pic>
+        <p:nvPicPr>
+          <p:cNvPr id="35" name="Picture 34">
+            <a:extLst>
+              <a:ext uri="{FF2B5EF4-FFF2-40B4-BE49-F238E27FC236}">
+                <a16:creationId xmlns:a16="http://schemas.microsoft.com/office/drawing/2014/main" id="{14541788-CF8A-4552-833B-219D1A8B75A8}"/>
+              </a:ext>
+            </a:extLst>
+          </p:cNvPr>
+          <p:cNvPicPr>
+            <a:picLocks noChangeAspect="1"/>
+          </p:cNvPicPr>
+          <p:nvPr/>
+        </p:nvPicPr>
+        <p:blipFill>
+          <a:blip r:embed="rId6"/>
+          <a:stretch>
+            <a:fillRect/>
+          </a:stretch>
+        </p:blipFill>
+        <p:spPr>
+          <a:xfrm>
+            <a:off x="6896456" y="928008"/>
+            <a:ext cx="2794664" cy="4738777"/>
+          </a:xfrm>
+          <a:prstGeom prst="rect">
+            <a:avLst/>
+          </a:prstGeom>
+          <a:ln>
+            <a:solidFill>
+              <a:schemeClr val="accent1"/>
+            </a:solidFill>
+          </a:ln>
+        </p:spPr>
+      </p:pic>
+      <p:sp>
+        <p:nvSpPr>
+          <p:cNvPr id="36" name="TextBox 35">
+            <a:extLst>
+              <a:ext uri="{FF2B5EF4-FFF2-40B4-BE49-F238E27FC236}">
+                <a16:creationId xmlns:a16="http://schemas.microsoft.com/office/drawing/2014/main" id="{A4EF4F84-38EB-495E-A154-CC16557BA7BE}"/>
+              </a:ext>
+            </a:extLst>
+          </p:cNvPr>
+          <p:cNvSpPr txBox="1"/>
+          <p:nvPr/>
+        </p:nvSpPr>
+        <p:spPr>
+          <a:xfrm>
+            <a:off x="7007348" y="535345"/>
+            <a:ext cx="2572879" cy="338554"/>
+          </a:xfrm>
+          <a:prstGeom prst="rect">
+            <a:avLst/>
+          </a:prstGeom>
+          <a:noFill/>
+        </p:spPr>
+        <p:txBody>
+          <a:bodyPr wrap="square" rtlCol="0">
+            <a:spAutoFit/>
+          </a:bodyPr>
+          <a:lstStyle/>
+          <a:p>
+            <a:r>
+              <a:rPr lang="sv-SE" sz="1600" dirty="0" err="1"/>
+              <a:t>Library</a:t>
+            </a:r>
+            <a:r>
+              <a:rPr lang="sv-SE" sz="1600" dirty="0"/>
+              <a:t>: </a:t>
+            </a:r>
+            <a:r>
+              <a:rPr lang="sv-SE" sz="1600" dirty="0" err="1"/>
+              <a:t>combined</a:t>
+            </a:r>
+            <a:r>
+              <a:rPr lang="sv-SE" sz="1600" dirty="0"/>
+              <a:t> </a:t>
+            </a:r>
+            <a:r>
+              <a:rPr lang="sv-SE" sz="1600" dirty="0" err="1"/>
+              <a:t>msp</a:t>
+            </a:r>
+            <a:r>
+              <a:rPr lang="sv-SE" sz="1600" dirty="0"/>
+              <a:t> </a:t>
+            </a:r>
+            <a:r>
+              <a:rPr lang="sv-SE" sz="1600" dirty="0" err="1"/>
+              <a:t>file</a:t>
+            </a:r>
+            <a:endParaRPr lang="sv-SE" sz="1600" dirty="0"/>
+          </a:p>
+        </p:txBody>
+      </p:sp>
+      <p:sp>
+        <p:nvSpPr>
+          <p:cNvPr id="37" name="Arrow: Right 36">
+            <a:extLst>
+              <a:ext uri="{FF2B5EF4-FFF2-40B4-BE49-F238E27FC236}">
+                <a16:creationId xmlns:a16="http://schemas.microsoft.com/office/drawing/2014/main" id="{4C87AF1A-D5C4-4579-8A72-0C35580FED76}"/>
+              </a:ext>
+            </a:extLst>
+          </p:cNvPr>
+          <p:cNvSpPr/>
+          <p:nvPr/>
+        </p:nvSpPr>
+        <p:spPr>
+          <a:xfrm>
+            <a:off x="9848675" y="2810312"/>
+            <a:ext cx="1291905" cy="461394"/>
+          </a:xfrm>
+          <a:prstGeom prst="rightArrow">
+            <a:avLst/>
+          </a:prstGeom>
+        </p:spPr>
+        <p:style>
+          <a:lnRef idx="2">
+            <a:schemeClr val="accent1">
+              <a:shade val="50000"/>
+            </a:schemeClr>
+          </a:lnRef>
+          <a:fillRef idx="1">
+            <a:schemeClr val="accent1"/>
+          </a:fillRef>
+          <a:effectRef idx="0">
+            <a:schemeClr val="accent1"/>
+          </a:effectRef>
+          <a:fontRef idx="minor">
+            <a:schemeClr val="lt1"/>
+          </a:fontRef>
+        </p:style>
+        <p:txBody>
+          <a:bodyPr rtlCol="0" anchor="ctr"/>
+          <a:lstStyle/>
+          <a:p>
+            <a:pPr algn="ctr"/>
+            <a:endParaRPr lang="sv-SE"/>
+          </a:p>
+        </p:txBody>
+      </p:sp>
+      <p:sp>
+        <p:nvSpPr>
+          <p:cNvPr id="38" name="TextBox 37">
+            <a:extLst>
+              <a:ext uri="{FF2B5EF4-FFF2-40B4-BE49-F238E27FC236}">
+                <a16:creationId xmlns:a16="http://schemas.microsoft.com/office/drawing/2014/main" id="{88D32AA9-AEDC-410C-B2DA-6330D5D41387}"/>
+              </a:ext>
+            </a:extLst>
+          </p:cNvPr>
+          <p:cNvSpPr txBox="1"/>
+          <p:nvPr/>
+        </p:nvSpPr>
+        <p:spPr>
+          <a:xfrm>
+            <a:off x="9848675" y="2281849"/>
+            <a:ext cx="1191237" cy="646331"/>
+          </a:xfrm>
+          <a:prstGeom prst="rect">
+            <a:avLst/>
+          </a:prstGeom>
+          <a:noFill/>
+        </p:spPr>
+        <p:txBody>
+          <a:bodyPr wrap="square" rtlCol="0">
+            <a:spAutoFit/>
+          </a:bodyPr>
+          <a:lstStyle/>
+          <a:p>
+            <a:r>
+              <a:rPr lang="sv-SE" dirty="0" err="1"/>
+              <a:t>Suspect</a:t>
+            </a:r>
+            <a:r>
+              <a:rPr lang="sv-SE" dirty="0"/>
+              <a:t> screening</a:t>
+            </a:r>
+          </a:p>
+        </p:txBody>
+      </p:sp>
+    </p:spTree>
+    <p:extLst>
+      <p:ext uri="{BB962C8B-B14F-4D97-AF65-F5344CB8AC3E}">
+        <p14:creationId xmlns:p14="http://schemas.microsoft.com/office/powerpoint/2010/main" val="3617453575"/>
+      </p:ext>
+    </p:extLst>
+  </p:cSld>
+  <p:clrMapOvr>
+    <a:masterClrMapping/>
+  </p:clrMapOvr>
+</p:sld>
+</file>
+
+<file path=ppt/slides/slide4.xml><?xml version="1.0" encoding="utf-8"?>
+<p:sld xmlns:a="http://schemas.openxmlformats.org/drawingml/2006/main" xmlns:r="http://schemas.openxmlformats.org/officeDocument/2006/relationships" xmlns:p="http://schemas.openxmlformats.org/presentationml/2006/main">
+  <p:cSld>
+    <p:spTree>
+      <p:nvGrpSpPr>
+        <p:cNvPr id="1" name=""/>
+        <p:cNvGrpSpPr/>
+        <p:nvPr/>
+      </p:nvGrpSpPr>
+      <p:grpSpPr>
+        <a:xfrm>
+          <a:off x="0" y="0"/>
+          <a:ext cx="0" cy="0"/>
+          <a:chOff x="0" y="0"/>
+          <a:chExt cx="0" cy="0"/>
+        </a:xfrm>
+      </p:grpSpPr>
       <p:pic>
         <p:nvPicPr>
           <p:cNvPr id="3" name="Picture 2">
@@ -4370,7 +5266,7 @@
 </p:sld>
 </file>
 
-<file path=ppt/slides/slide3.xml><?xml version="1.0" encoding="utf-8"?>
+<file path=ppt/slides/slide5.xml><?xml version="1.0" encoding="utf-8"?>
 <p:sld xmlns:a="http://schemas.openxmlformats.org/drawingml/2006/main" xmlns:r="http://schemas.openxmlformats.org/officeDocument/2006/relationships" xmlns:p="http://schemas.openxmlformats.org/presentationml/2006/main">
   <p:cSld>
     <p:spTree>
@@ -4916,7 +5812,7 @@
 </p:sld>
 </file>
 
-<file path=ppt/slides/slide4.xml><?xml version="1.0" encoding="utf-8"?>
+<file path=ppt/slides/slide6.xml><?xml version="1.0" encoding="utf-8"?>
 <p:sld xmlns:a="http://schemas.openxmlformats.org/drawingml/2006/main" xmlns:r="http://schemas.openxmlformats.org/officeDocument/2006/relationships" xmlns:p="http://schemas.openxmlformats.org/presentationml/2006/main">
   <p:cSld>
     <p:spTree>

</xml_diff>

<commit_message>
added to LC spec lib
</commit_message>
<xml_diff>
--- a/images/figures.pptx
+++ b/images/figures.pptx
@@ -5,15 +5,16 @@
     <p:sldMasterId id="2147483648" r:id="rId1"/>
   </p:sldMasterIdLst>
   <p:notesMasterIdLst>
-    <p:notesMasterId r:id="rId8"/>
+    <p:notesMasterId r:id="rId9"/>
   </p:notesMasterIdLst>
   <p:sldIdLst>
     <p:sldId id="256" r:id="rId2"/>
-    <p:sldId id="260" r:id="rId3"/>
-    <p:sldId id="261" r:id="rId4"/>
+    <p:sldId id="261" r:id="rId3"/>
+    <p:sldId id="262" r:id="rId4"/>
     <p:sldId id="257" r:id="rId5"/>
     <p:sldId id="258" r:id="rId6"/>
     <p:sldId id="259" r:id="rId7"/>
+    <p:sldId id="260" r:id="rId8"/>
   </p:sldIdLst>
   <p:sldSz cx="12192000" cy="6858000"/>
   <p:notesSz cx="6858000" cy="9144000"/>
@@ -202,7 +203,7 @@
           <a:p>
             <a:fld id="{4217D5F8-6A3D-4B61-AF66-A6E7E18C4963}" type="datetimeFigureOut">
               <a:rPr lang="sv-SE" smtClean="0"/>
-              <a:t>2021-06-03</a:t>
+              <a:t>2021-06-10</a:t>
             </a:fld>
             <a:endParaRPr lang="sv-SE"/>
           </a:p>
@@ -701,7 +702,7 @@
           <a:p>
             <a:fld id="{D103641A-5BA2-451A-9886-04FF904A5C86}" type="datetimeFigureOut">
               <a:rPr lang="en-US" smtClean="0"/>
-              <a:t>6/3/2021</a:t>
+              <a:t>6/10/2021</a:t>
             </a:fld>
             <a:endParaRPr lang="en-US"/>
           </a:p>
@@ -899,7 +900,7 @@
           <a:p>
             <a:fld id="{D103641A-5BA2-451A-9886-04FF904A5C86}" type="datetimeFigureOut">
               <a:rPr lang="en-US" smtClean="0"/>
-              <a:t>6/3/2021</a:t>
+              <a:t>6/10/2021</a:t>
             </a:fld>
             <a:endParaRPr lang="en-US"/>
           </a:p>
@@ -1107,7 +1108,7 @@
           <a:p>
             <a:fld id="{D103641A-5BA2-451A-9886-04FF904A5C86}" type="datetimeFigureOut">
               <a:rPr lang="en-US" smtClean="0"/>
-              <a:t>6/3/2021</a:t>
+              <a:t>6/10/2021</a:t>
             </a:fld>
             <a:endParaRPr lang="en-US"/>
           </a:p>
@@ -1305,7 +1306,7 @@
           <a:p>
             <a:fld id="{D103641A-5BA2-451A-9886-04FF904A5C86}" type="datetimeFigureOut">
               <a:rPr lang="en-US" smtClean="0"/>
-              <a:t>6/3/2021</a:t>
+              <a:t>6/10/2021</a:t>
             </a:fld>
             <a:endParaRPr lang="en-US"/>
           </a:p>
@@ -1580,7 +1581,7 @@
           <a:p>
             <a:fld id="{D103641A-5BA2-451A-9886-04FF904A5C86}" type="datetimeFigureOut">
               <a:rPr lang="en-US" smtClean="0"/>
-              <a:t>6/3/2021</a:t>
+              <a:t>6/10/2021</a:t>
             </a:fld>
             <a:endParaRPr lang="en-US"/>
           </a:p>
@@ -1845,7 +1846,7 @@
           <a:p>
             <a:fld id="{D103641A-5BA2-451A-9886-04FF904A5C86}" type="datetimeFigureOut">
               <a:rPr lang="en-US" smtClean="0"/>
-              <a:t>6/3/2021</a:t>
+              <a:t>6/10/2021</a:t>
             </a:fld>
             <a:endParaRPr lang="en-US"/>
           </a:p>
@@ -2257,7 +2258,7 @@
           <a:p>
             <a:fld id="{D103641A-5BA2-451A-9886-04FF904A5C86}" type="datetimeFigureOut">
               <a:rPr lang="en-US" smtClean="0"/>
-              <a:t>6/3/2021</a:t>
+              <a:t>6/10/2021</a:t>
             </a:fld>
             <a:endParaRPr lang="en-US"/>
           </a:p>
@@ -2398,7 +2399,7 @@
           <a:p>
             <a:fld id="{D103641A-5BA2-451A-9886-04FF904A5C86}" type="datetimeFigureOut">
               <a:rPr lang="en-US" smtClean="0"/>
-              <a:t>6/3/2021</a:t>
+              <a:t>6/10/2021</a:t>
             </a:fld>
             <a:endParaRPr lang="en-US"/>
           </a:p>
@@ -2511,7 +2512,7 @@
           <a:p>
             <a:fld id="{D103641A-5BA2-451A-9886-04FF904A5C86}" type="datetimeFigureOut">
               <a:rPr lang="en-US" smtClean="0"/>
-              <a:t>6/3/2021</a:t>
+              <a:t>6/10/2021</a:t>
             </a:fld>
             <a:endParaRPr lang="en-US"/>
           </a:p>
@@ -2822,7 +2823,7 @@
           <a:p>
             <a:fld id="{D103641A-5BA2-451A-9886-04FF904A5C86}" type="datetimeFigureOut">
               <a:rPr lang="en-US" smtClean="0"/>
-              <a:t>6/3/2021</a:t>
+              <a:t>6/10/2021</a:t>
             </a:fld>
             <a:endParaRPr lang="en-US"/>
           </a:p>
@@ -3110,7 +3111,7 @@
           <a:p>
             <a:fld id="{D103641A-5BA2-451A-9886-04FF904A5C86}" type="datetimeFigureOut">
               <a:rPr lang="en-US" smtClean="0"/>
-              <a:t>6/3/2021</a:t>
+              <a:t>6/10/2021</a:t>
             </a:fld>
             <a:endParaRPr lang="en-US"/>
           </a:p>
@@ -3351,7 +3352,7 @@
           <a:p>
             <a:fld id="{D103641A-5BA2-451A-9886-04FF904A5C86}" type="datetimeFigureOut">
               <a:rPr lang="en-US" smtClean="0"/>
-              <a:t>6/3/2021</a:t>
+              <a:t>6/10/2021</a:t>
             </a:fld>
             <a:endParaRPr lang="en-US"/>
           </a:p>
@@ -4061,10 +4062,844 @@
           <a:chExt cx="0" cy="0"/>
         </a:xfrm>
       </p:grpSpPr>
+      <p:pic>
+        <p:nvPicPr>
+          <p:cNvPr id="5" name="Picture 4">
+            <a:extLst>
+              <a:ext uri="{FF2B5EF4-FFF2-40B4-BE49-F238E27FC236}">
+                <a16:creationId xmlns:a16="http://schemas.microsoft.com/office/drawing/2014/main" id="{E2C1982F-EB3F-4162-88B9-0FF4E417E426}"/>
+              </a:ext>
+            </a:extLst>
+          </p:cNvPr>
+          <p:cNvPicPr>
+            <a:picLocks noChangeAspect="1"/>
+          </p:cNvPicPr>
+          <p:nvPr/>
+        </p:nvPicPr>
+        <p:blipFill rotWithShape="1">
+          <a:blip r:embed="rId2"/>
+          <a:srcRect l="20102" t="6756" r="42570"/>
+          <a:stretch/>
+        </p:blipFill>
+        <p:spPr>
+          <a:xfrm>
+            <a:off x="320387" y="651009"/>
+            <a:ext cx="2497361" cy="1849956"/>
+          </a:xfrm>
+          <a:prstGeom prst="rect">
+            <a:avLst/>
+          </a:prstGeom>
+          <a:ln>
+            <a:solidFill>
+              <a:schemeClr val="accent1"/>
+            </a:solidFill>
+          </a:ln>
+        </p:spPr>
+      </p:pic>
+      <p:sp>
+        <p:nvSpPr>
+          <p:cNvPr id="6" name="Arrow: Right 5">
+            <a:extLst>
+              <a:ext uri="{FF2B5EF4-FFF2-40B4-BE49-F238E27FC236}">
+                <a16:creationId xmlns:a16="http://schemas.microsoft.com/office/drawing/2014/main" id="{8B7A57B1-0AB7-4553-BEE0-DFF235D9BC14}"/>
+              </a:ext>
+            </a:extLst>
+          </p:cNvPr>
+          <p:cNvSpPr/>
+          <p:nvPr/>
+        </p:nvSpPr>
+        <p:spPr>
+          <a:xfrm>
+            <a:off x="2918543" y="1320123"/>
+            <a:ext cx="570451" cy="511728"/>
+          </a:xfrm>
+          <a:prstGeom prst="rightArrow">
+            <a:avLst/>
+          </a:prstGeom>
+        </p:spPr>
+        <p:style>
+          <a:lnRef idx="2">
+            <a:schemeClr val="accent1">
+              <a:shade val="50000"/>
+            </a:schemeClr>
+          </a:lnRef>
+          <a:fillRef idx="1">
+            <a:schemeClr val="accent1"/>
+          </a:fillRef>
+          <a:effectRef idx="0">
+            <a:schemeClr val="accent1"/>
+          </a:effectRef>
+          <a:fontRef idx="minor">
+            <a:schemeClr val="lt1"/>
+          </a:fontRef>
+        </p:style>
+        <p:txBody>
+          <a:bodyPr rtlCol="0" anchor="ctr"/>
+          <a:lstStyle/>
+          <a:p>
+            <a:pPr algn="ctr"/>
+            <a:endParaRPr lang="sv-SE"/>
+          </a:p>
+        </p:txBody>
+      </p:sp>
+      <p:pic>
+        <p:nvPicPr>
+          <p:cNvPr id="8" name="Picture 7">
+            <a:extLst>
+              <a:ext uri="{FF2B5EF4-FFF2-40B4-BE49-F238E27FC236}">
+                <a16:creationId xmlns:a16="http://schemas.microsoft.com/office/drawing/2014/main" id="{1130FE08-5FC9-45F4-AB61-891398180C46}"/>
+              </a:ext>
+            </a:extLst>
+          </p:cNvPr>
+          <p:cNvPicPr>
+            <a:picLocks noChangeAspect="1"/>
+          </p:cNvPicPr>
+          <p:nvPr/>
+        </p:nvPicPr>
+        <p:blipFill rotWithShape="1">
+          <a:blip r:embed="rId3"/>
+          <a:srcRect b="16159"/>
+          <a:stretch/>
+        </p:blipFill>
+        <p:spPr>
+          <a:xfrm>
+            <a:off x="3728451" y="535345"/>
+            <a:ext cx="2043173" cy="2470800"/>
+          </a:xfrm>
+          <a:prstGeom prst="rect">
+            <a:avLst/>
+          </a:prstGeom>
+          <a:ln>
+            <a:solidFill>
+              <a:schemeClr val="accent1"/>
+            </a:solidFill>
+          </a:ln>
+        </p:spPr>
+      </p:pic>
+      <p:sp>
+        <p:nvSpPr>
+          <p:cNvPr id="9" name="TextBox 8">
+            <a:extLst>
+              <a:ext uri="{FF2B5EF4-FFF2-40B4-BE49-F238E27FC236}">
+                <a16:creationId xmlns:a16="http://schemas.microsoft.com/office/drawing/2014/main" id="{E738B35D-1593-4734-ABC8-D4974D6640B1}"/>
+              </a:ext>
+            </a:extLst>
+          </p:cNvPr>
+          <p:cNvSpPr txBox="1"/>
+          <p:nvPr/>
+        </p:nvSpPr>
+        <p:spPr>
+          <a:xfrm>
+            <a:off x="1569067" y="782032"/>
+            <a:ext cx="1070222" cy="830997"/>
+          </a:xfrm>
+          <a:prstGeom prst="rect">
+            <a:avLst/>
+          </a:prstGeom>
+          <a:solidFill>
+            <a:schemeClr val="bg1"/>
+          </a:solidFill>
+          <a:ln>
+            <a:solidFill>
+              <a:schemeClr val="accent1"/>
+            </a:solidFill>
+          </a:ln>
+        </p:spPr>
+        <p:txBody>
+          <a:bodyPr wrap="square" rtlCol="0">
+            <a:spAutoFit/>
+          </a:bodyPr>
+          <a:lstStyle/>
+          <a:p>
+            <a:r>
+              <a:rPr lang="sv-SE" sz="1200" b="1" dirty="0"/>
+              <a:t>GC-HRMS </a:t>
+            </a:r>
+            <a:r>
+              <a:rPr lang="sv-SE" sz="1200" b="1" dirty="0" err="1"/>
+              <a:t>analysis</a:t>
+            </a:r>
+            <a:r>
+              <a:rPr lang="sv-SE" sz="1200" b="1" dirty="0"/>
+              <a:t> </a:t>
+            </a:r>
+            <a:r>
+              <a:rPr lang="sv-SE" sz="1200" b="1" dirty="0" err="1"/>
+              <a:t>of</a:t>
+            </a:r>
+            <a:r>
+              <a:rPr lang="sv-SE" sz="1200" b="1" dirty="0"/>
+              <a:t> </a:t>
+            </a:r>
+            <a:r>
+              <a:rPr lang="sv-SE" sz="1200" b="1" dirty="0" err="1"/>
+              <a:t>chloroatranol</a:t>
+            </a:r>
+            <a:r>
+              <a:rPr lang="sv-SE" sz="1200" b="1" dirty="0"/>
+              <a:t> standard</a:t>
+            </a:r>
+          </a:p>
+        </p:txBody>
+      </p:sp>
+      <p:sp>
+        <p:nvSpPr>
+          <p:cNvPr id="10" name="TextBox 9">
+            <a:extLst>
+              <a:ext uri="{FF2B5EF4-FFF2-40B4-BE49-F238E27FC236}">
+                <a16:creationId xmlns:a16="http://schemas.microsoft.com/office/drawing/2014/main" id="{5B3CFD18-593B-4B65-AB8A-55377EE144A5}"/>
+              </a:ext>
+            </a:extLst>
+          </p:cNvPr>
+          <p:cNvSpPr txBox="1"/>
+          <p:nvPr/>
+        </p:nvSpPr>
+        <p:spPr>
+          <a:xfrm>
+            <a:off x="4632992" y="651009"/>
+            <a:ext cx="922790" cy="276999"/>
+          </a:xfrm>
+          <a:prstGeom prst="rect">
+            <a:avLst/>
+          </a:prstGeom>
+          <a:noFill/>
+          <a:ln>
+            <a:solidFill>
+              <a:schemeClr val="accent1"/>
+            </a:solidFill>
+          </a:ln>
+        </p:spPr>
+        <p:txBody>
+          <a:bodyPr wrap="square" rtlCol="0">
+            <a:spAutoFit/>
+          </a:bodyPr>
+          <a:lstStyle/>
+          <a:p>
+            <a:r>
+              <a:rPr lang="sv-SE" sz="1200" b="1" dirty="0"/>
+              <a:t>Metainfo</a:t>
+            </a:r>
+          </a:p>
+        </p:txBody>
+      </p:sp>
+      <p:sp>
+        <p:nvSpPr>
+          <p:cNvPr id="11" name="TextBox 10">
+            <a:extLst>
+              <a:ext uri="{FF2B5EF4-FFF2-40B4-BE49-F238E27FC236}">
+                <a16:creationId xmlns:a16="http://schemas.microsoft.com/office/drawing/2014/main" id="{C6AB57E3-80E2-4C70-ABF1-71EE530D2725}"/>
+              </a:ext>
+            </a:extLst>
+          </p:cNvPr>
+          <p:cNvSpPr txBox="1"/>
+          <p:nvPr/>
+        </p:nvSpPr>
+        <p:spPr>
+          <a:xfrm>
+            <a:off x="4440744" y="1674688"/>
+            <a:ext cx="1115038" cy="276999"/>
+          </a:xfrm>
+          <a:prstGeom prst="rect">
+            <a:avLst/>
+          </a:prstGeom>
+          <a:noFill/>
+          <a:ln>
+            <a:solidFill>
+              <a:schemeClr val="accent1"/>
+            </a:solidFill>
+          </a:ln>
+        </p:spPr>
+        <p:txBody>
+          <a:bodyPr wrap="square" rtlCol="0">
+            <a:spAutoFit/>
+          </a:bodyPr>
+          <a:lstStyle/>
+          <a:p>
+            <a:r>
+              <a:rPr lang="sv-SE" sz="1200" b="1" dirty="0" err="1"/>
+              <a:t>Accurate</a:t>
+            </a:r>
+            <a:r>
+              <a:rPr lang="sv-SE" sz="1200" b="1" dirty="0"/>
+              <a:t> m/z </a:t>
+            </a:r>
+          </a:p>
+        </p:txBody>
+      </p:sp>
+      <p:sp>
+        <p:nvSpPr>
+          <p:cNvPr id="12" name="TextBox 11">
+            <a:extLst>
+              <a:ext uri="{FF2B5EF4-FFF2-40B4-BE49-F238E27FC236}">
+                <a16:creationId xmlns:a16="http://schemas.microsoft.com/office/drawing/2014/main" id="{FF757112-382C-4400-987A-4E914D6D3E27}"/>
+              </a:ext>
+            </a:extLst>
+          </p:cNvPr>
+          <p:cNvSpPr txBox="1"/>
+          <p:nvPr/>
+        </p:nvSpPr>
+        <p:spPr>
+          <a:xfrm>
+            <a:off x="4750036" y="2328016"/>
+            <a:ext cx="805745" cy="276999"/>
+          </a:xfrm>
+          <a:prstGeom prst="rect">
+            <a:avLst/>
+          </a:prstGeom>
+          <a:noFill/>
+          <a:ln>
+            <a:solidFill>
+              <a:schemeClr val="accent1"/>
+            </a:solidFill>
+          </a:ln>
+        </p:spPr>
+        <p:txBody>
+          <a:bodyPr wrap="square" rtlCol="0">
+            <a:spAutoFit/>
+          </a:bodyPr>
+          <a:lstStyle/>
+          <a:p>
+            <a:r>
+              <a:rPr lang="sv-SE" sz="1200" b="1" dirty="0" err="1"/>
+              <a:t>Intensity</a:t>
+            </a:r>
+            <a:endParaRPr lang="sv-SE" sz="1200" b="1" dirty="0"/>
+          </a:p>
+        </p:txBody>
+      </p:sp>
+      <p:cxnSp>
+        <p:nvCxnSpPr>
+          <p:cNvPr id="14" name="Straight Arrow Connector 13">
+            <a:extLst>
+              <a:ext uri="{FF2B5EF4-FFF2-40B4-BE49-F238E27FC236}">
+                <a16:creationId xmlns:a16="http://schemas.microsoft.com/office/drawing/2014/main" id="{006F837E-536E-47AF-A55C-575ACFECBD13}"/>
+              </a:ext>
+            </a:extLst>
+          </p:cNvPr>
+          <p:cNvCxnSpPr>
+            <a:cxnSpLocks/>
+            <a:stCxn id="11" idx="1"/>
+          </p:cNvCxnSpPr>
+          <p:nvPr/>
+        </p:nvCxnSpPr>
+        <p:spPr>
+          <a:xfrm flipH="1">
+            <a:off x="4051881" y="1813188"/>
+            <a:ext cx="388863" cy="321839"/>
+          </a:xfrm>
+          <a:prstGeom prst="straightConnector1">
+            <a:avLst/>
+          </a:prstGeom>
+          <a:ln>
+            <a:tailEnd type="triangle"/>
+          </a:ln>
+        </p:spPr>
+        <p:style>
+          <a:lnRef idx="1">
+            <a:schemeClr val="accent1"/>
+          </a:lnRef>
+          <a:fillRef idx="0">
+            <a:schemeClr val="accent1"/>
+          </a:fillRef>
+          <a:effectRef idx="0">
+            <a:schemeClr val="accent1"/>
+          </a:effectRef>
+          <a:fontRef idx="minor">
+            <a:schemeClr val="tx1"/>
+          </a:fontRef>
+        </p:style>
+      </p:cxnSp>
+      <p:cxnSp>
+        <p:nvCxnSpPr>
+          <p:cNvPr id="15" name="Straight Arrow Connector 14">
+            <a:extLst>
+              <a:ext uri="{FF2B5EF4-FFF2-40B4-BE49-F238E27FC236}">
+                <a16:creationId xmlns:a16="http://schemas.microsoft.com/office/drawing/2014/main" id="{70ED1FA4-B4FB-4700-B1FA-105DCACE911A}"/>
+              </a:ext>
+            </a:extLst>
+          </p:cNvPr>
+          <p:cNvCxnSpPr>
+            <a:cxnSpLocks/>
+            <a:stCxn id="12" idx="1"/>
+          </p:cNvCxnSpPr>
+          <p:nvPr/>
+        </p:nvCxnSpPr>
+        <p:spPr>
+          <a:xfrm flipH="1">
+            <a:off x="4440746" y="2466516"/>
+            <a:ext cx="309290" cy="92333"/>
+          </a:xfrm>
+          <a:prstGeom prst="straightConnector1">
+            <a:avLst/>
+          </a:prstGeom>
+          <a:ln>
+            <a:tailEnd type="triangle"/>
+          </a:ln>
+        </p:spPr>
+        <p:style>
+          <a:lnRef idx="1">
+            <a:schemeClr val="accent1"/>
+          </a:lnRef>
+          <a:fillRef idx="0">
+            <a:schemeClr val="accent1"/>
+          </a:fillRef>
+          <a:effectRef idx="0">
+            <a:schemeClr val="accent1"/>
+          </a:effectRef>
+          <a:fontRef idx="minor">
+            <a:schemeClr val="tx1"/>
+          </a:fontRef>
+        </p:style>
+      </p:cxnSp>
+      <p:pic>
+        <p:nvPicPr>
+          <p:cNvPr id="20" name="Picture 19">
+            <a:extLst>
+              <a:ext uri="{FF2B5EF4-FFF2-40B4-BE49-F238E27FC236}">
+                <a16:creationId xmlns:a16="http://schemas.microsoft.com/office/drawing/2014/main" id="{7576AF11-1EDF-4001-95D0-9578E1B65EDE}"/>
+              </a:ext>
+            </a:extLst>
+          </p:cNvPr>
+          <p:cNvPicPr>
+            <a:picLocks noChangeAspect="1"/>
+          </p:cNvPicPr>
+          <p:nvPr/>
+        </p:nvPicPr>
+        <p:blipFill rotWithShape="1">
+          <a:blip r:embed="rId4"/>
+          <a:srcRect t="3108"/>
+          <a:stretch/>
+        </p:blipFill>
+        <p:spPr>
+          <a:xfrm>
+            <a:off x="309602" y="4058558"/>
+            <a:ext cx="2508146" cy="1849956"/>
+          </a:xfrm>
+          <a:prstGeom prst="rect">
+            <a:avLst/>
+          </a:prstGeom>
+          <a:ln>
+            <a:solidFill>
+              <a:schemeClr val="accent1"/>
+            </a:solidFill>
+          </a:ln>
+        </p:spPr>
+      </p:pic>
+      <p:sp>
+        <p:nvSpPr>
+          <p:cNvPr id="21" name="TextBox 20">
+            <a:extLst>
+              <a:ext uri="{FF2B5EF4-FFF2-40B4-BE49-F238E27FC236}">
+                <a16:creationId xmlns:a16="http://schemas.microsoft.com/office/drawing/2014/main" id="{8E7BCB21-E14A-4307-AE5E-7FB7B61B188D}"/>
+              </a:ext>
+            </a:extLst>
+          </p:cNvPr>
+          <p:cNvSpPr txBox="1"/>
+          <p:nvPr/>
+        </p:nvSpPr>
+        <p:spPr>
+          <a:xfrm>
+            <a:off x="376833" y="4152539"/>
+            <a:ext cx="1070222" cy="830997"/>
+          </a:xfrm>
+          <a:prstGeom prst="rect">
+            <a:avLst/>
+          </a:prstGeom>
+          <a:solidFill>
+            <a:schemeClr val="bg1"/>
+          </a:solidFill>
+          <a:ln>
+            <a:solidFill>
+              <a:schemeClr val="accent1"/>
+            </a:solidFill>
+          </a:ln>
+        </p:spPr>
+        <p:txBody>
+          <a:bodyPr wrap="square" rtlCol="0">
+            <a:spAutoFit/>
+          </a:bodyPr>
+          <a:lstStyle/>
+          <a:p>
+            <a:r>
+              <a:rPr lang="sv-SE" sz="1200" b="1" dirty="0"/>
+              <a:t>GC-HRMS </a:t>
+            </a:r>
+            <a:r>
+              <a:rPr lang="sv-SE" sz="1200" b="1" dirty="0" err="1"/>
+              <a:t>analysis</a:t>
+            </a:r>
+            <a:r>
+              <a:rPr lang="sv-SE" sz="1200" b="1" dirty="0"/>
+              <a:t> </a:t>
+            </a:r>
+            <a:r>
+              <a:rPr lang="sv-SE" sz="1200" b="1" dirty="0" err="1"/>
+              <a:t>of</a:t>
+            </a:r>
+            <a:r>
+              <a:rPr lang="sv-SE" sz="1200" b="1" dirty="0"/>
+              <a:t> LCM-4 standard</a:t>
+            </a:r>
+          </a:p>
+        </p:txBody>
+      </p:sp>
+      <p:sp>
+        <p:nvSpPr>
+          <p:cNvPr id="27" name="Arrow: Right 26">
+            <a:extLst>
+              <a:ext uri="{FF2B5EF4-FFF2-40B4-BE49-F238E27FC236}">
+                <a16:creationId xmlns:a16="http://schemas.microsoft.com/office/drawing/2014/main" id="{31039317-915C-4B08-A185-9809CF9C8365}"/>
+              </a:ext>
+            </a:extLst>
+          </p:cNvPr>
+          <p:cNvSpPr/>
+          <p:nvPr/>
+        </p:nvSpPr>
+        <p:spPr>
+          <a:xfrm>
+            <a:off x="2918543" y="4727672"/>
+            <a:ext cx="570451" cy="511728"/>
+          </a:xfrm>
+          <a:prstGeom prst="rightArrow">
+            <a:avLst/>
+          </a:prstGeom>
+        </p:spPr>
+        <p:style>
+          <a:lnRef idx="2">
+            <a:schemeClr val="accent1">
+              <a:shade val="50000"/>
+            </a:schemeClr>
+          </a:lnRef>
+          <a:fillRef idx="1">
+            <a:schemeClr val="accent1"/>
+          </a:fillRef>
+          <a:effectRef idx="0">
+            <a:schemeClr val="accent1"/>
+          </a:effectRef>
+          <a:fontRef idx="minor">
+            <a:schemeClr val="lt1"/>
+          </a:fontRef>
+        </p:style>
+        <p:txBody>
+          <a:bodyPr rtlCol="0" anchor="ctr"/>
+          <a:lstStyle/>
+          <a:p>
+            <a:pPr algn="ctr"/>
+            <a:endParaRPr lang="sv-SE"/>
+          </a:p>
+        </p:txBody>
+      </p:sp>
+      <p:pic>
+        <p:nvPicPr>
+          <p:cNvPr id="29" name="Picture 28">
+            <a:extLst>
+              <a:ext uri="{FF2B5EF4-FFF2-40B4-BE49-F238E27FC236}">
+                <a16:creationId xmlns:a16="http://schemas.microsoft.com/office/drawing/2014/main" id="{1DD838E1-C353-4497-9E36-A203ADD4D857}"/>
+              </a:ext>
+            </a:extLst>
+          </p:cNvPr>
+          <p:cNvPicPr>
+            <a:picLocks noChangeAspect="1"/>
+          </p:cNvPicPr>
+          <p:nvPr/>
+        </p:nvPicPr>
+        <p:blipFill>
+          <a:blip r:embed="rId5"/>
+          <a:stretch>
+            <a:fillRect/>
+          </a:stretch>
+        </p:blipFill>
+        <p:spPr>
+          <a:xfrm>
+            <a:off x="3712300" y="3520974"/>
+            <a:ext cx="2075472" cy="2470800"/>
+          </a:xfrm>
+          <a:prstGeom prst="rect">
+            <a:avLst/>
+          </a:prstGeom>
+          <a:ln>
+            <a:solidFill>
+              <a:schemeClr val="accent1"/>
+            </a:solidFill>
+          </a:ln>
+        </p:spPr>
+      </p:pic>
+      <p:sp>
+        <p:nvSpPr>
+          <p:cNvPr id="30" name="Arrow: Right 29">
+            <a:extLst>
+              <a:ext uri="{FF2B5EF4-FFF2-40B4-BE49-F238E27FC236}">
+                <a16:creationId xmlns:a16="http://schemas.microsoft.com/office/drawing/2014/main" id="{86DA9541-B788-4122-8AEC-C60D10447DAC}"/>
+              </a:ext>
+            </a:extLst>
+          </p:cNvPr>
+          <p:cNvSpPr/>
+          <p:nvPr/>
+        </p:nvSpPr>
+        <p:spPr>
+          <a:xfrm rot="20270422">
+            <a:off x="5974993" y="3921384"/>
+            <a:ext cx="858473" cy="503339"/>
+          </a:xfrm>
+          <a:prstGeom prst="rightArrow">
+            <a:avLst/>
+          </a:prstGeom>
+        </p:spPr>
+        <p:style>
+          <a:lnRef idx="2">
+            <a:schemeClr val="accent1">
+              <a:shade val="50000"/>
+            </a:schemeClr>
+          </a:lnRef>
+          <a:fillRef idx="1">
+            <a:schemeClr val="accent1"/>
+          </a:fillRef>
+          <a:effectRef idx="0">
+            <a:schemeClr val="accent1"/>
+          </a:effectRef>
+          <a:fontRef idx="minor">
+            <a:schemeClr val="lt1"/>
+          </a:fontRef>
+        </p:style>
+        <p:txBody>
+          <a:bodyPr rtlCol="0" anchor="ctr"/>
+          <a:lstStyle/>
+          <a:p>
+            <a:pPr algn="ctr"/>
+            <a:endParaRPr lang="sv-SE"/>
+          </a:p>
+        </p:txBody>
+      </p:sp>
+      <p:sp>
+        <p:nvSpPr>
+          <p:cNvPr id="31" name="Arrow: Right 30">
+            <a:extLst>
+              <a:ext uri="{FF2B5EF4-FFF2-40B4-BE49-F238E27FC236}">
+                <a16:creationId xmlns:a16="http://schemas.microsoft.com/office/drawing/2014/main" id="{5528C216-6EE4-4570-8489-66B2DE94DCA6}"/>
+              </a:ext>
+            </a:extLst>
+          </p:cNvPr>
+          <p:cNvSpPr/>
+          <p:nvPr/>
+        </p:nvSpPr>
+        <p:spPr>
+          <a:xfrm rot="1650898">
+            <a:off x="5970267" y="1620282"/>
+            <a:ext cx="858473" cy="503339"/>
+          </a:xfrm>
+          <a:prstGeom prst="rightArrow">
+            <a:avLst/>
+          </a:prstGeom>
+        </p:spPr>
+        <p:style>
+          <a:lnRef idx="2">
+            <a:schemeClr val="accent1">
+              <a:shade val="50000"/>
+            </a:schemeClr>
+          </a:lnRef>
+          <a:fillRef idx="1">
+            <a:schemeClr val="accent1"/>
+          </a:fillRef>
+          <a:effectRef idx="0">
+            <a:schemeClr val="accent1"/>
+          </a:effectRef>
+          <a:fontRef idx="minor">
+            <a:schemeClr val="lt1"/>
+          </a:fontRef>
+        </p:style>
+        <p:txBody>
+          <a:bodyPr rtlCol="0" anchor="ctr"/>
+          <a:lstStyle/>
+          <a:p>
+            <a:pPr algn="ctr"/>
+            <a:endParaRPr lang="sv-SE" dirty="0"/>
+          </a:p>
+        </p:txBody>
+      </p:sp>
+      <p:pic>
+        <p:nvPicPr>
+          <p:cNvPr id="35" name="Picture 34">
+            <a:extLst>
+              <a:ext uri="{FF2B5EF4-FFF2-40B4-BE49-F238E27FC236}">
+                <a16:creationId xmlns:a16="http://schemas.microsoft.com/office/drawing/2014/main" id="{14541788-CF8A-4552-833B-219D1A8B75A8}"/>
+              </a:ext>
+            </a:extLst>
+          </p:cNvPr>
+          <p:cNvPicPr>
+            <a:picLocks noChangeAspect="1"/>
+          </p:cNvPicPr>
+          <p:nvPr/>
+        </p:nvPicPr>
+        <p:blipFill>
+          <a:blip r:embed="rId6"/>
+          <a:stretch>
+            <a:fillRect/>
+          </a:stretch>
+        </p:blipFill>
+        <p:spPr>
+          <a:xfrm>
+            <a:off x="6896456" y="928008"/>
+            <a:ext cx="2794664" cy="4738777"/>
+          </a:xfrm>
+          <a:prstGeom prst="rect">
+            <a:avLst/>
+          </a:prstGeom>
+          <a:ln>
+            <a:solidFill>
+              <a:schemeClr val="accent1"/>
+            </a:solidFill>
+          </a:ln>
+        </p:spPr>
+      </p:pic>
+      <p:sp>
+        <p:nvSpPr>
+          <p:cNvPr id="36" name="TextBox 35">
+            <a:extLst>
+              <a:ext uri="{FF2B5EF4-FFF2-40B4-BE49-F238E27FC236}">
+                <a16:creationId xmlns:a16="http://schemas.microsoft.com/office/drawing/2014/main" id="{A4EF4F84-38EB-495E-A154-CC16557BA7BE}"/>
+              </a:ext>
+            </a:extLst>
+          </p:cNvPr>
+          <p:cNvSpPr txBox="1"/>
+          <p:nvPr/>
+        </p:nvSpPr>
+        <p:spPr>
+          <a:xfrm>
+            <a:off x="7007348" y="535345"/>
+            <a:ext cx="2572879" cy="338554"/>
+          </a:xfrm>
+          <a:prstGeom prst="rect">
+            <a:avLst/>
+          </a:prstGeom>
+          <a:noFill/>
+        </p:spPr>
+        <p:txBody>
+          <a:bodyPr wrap="square" rtlCol="0">
+            <a:spAutoFit/>
+          </a:bodyPr>
+          <a:lstStyle/>
+          <a:p>
+            <a:r>
+              <a:rPr lang="sv-SE" sz="1600" dirty="0" err="1"/>
+              <a:t>Library</a:t>
+            </a:r>
+            <a:r>
+              <a:rPr lang="sv-SE" sz="1600" dirty="0"/>
+              <a:t>: </a:t>
+            </a:r>
+            <a:r>
+              <a:rPr lang="sv-SE" sz="1600" dirty="0" err="1"/>
+              <a:t>combined</a:t>
+            </a:r>
+            <a:r>
+              <a:rPr lang="sv-SE" sz="1600" dirty="0"/>
+              <a:t> </a:t>
+            </a:r>
+            <a:r>
+              <a:rPr lang="sv-SE" sz="1600" dirty="0" err="1"/>
+              <a:t>msp</a:t>
+            </a:r>
+            <a:r>
+              <a:rPr lang="sv-SE" sz="1600" dirty="0"/>
+              <a:t> </a:t>
+            </a:r>
+            <a:r>
+              <a:rPr lang="sv-SE" sz="1600" dirty="0" err="1"/>
+              <a:t>file</a:t>
+            </a:r>
+            <a:endParaRPr lang="sv-SE" sz="1600" dirty="0"/>
+          </a:p>
+        </p:txBody>
+      </p:sp>
+      <p:sp>
+        <p:nvSpPr>
+          <p:cNvPr id="37" name="Arrow: Right 36">
+            <a:extLst>
+              <a:ext uri="{FF2B5EF4-FFF2-40B4-BE49-F238E27FC236}">
+                <a16:creationId xmlns:a16="http://schemas.microsoft.com/office/drawing/2014/main" id="{4C87AF1A-D5C4-4579-8A72-0C35580FED76}"/>
+              </a:ext>
+            </a:extLst>
+          </p:cNvPr>
+          <p:cNvSpPr/>
+          <p:nvPr/>
+        </p:nvSpPr>
+        <p:spPr>
+          <a:xfrm>
+            <a:off x="9848675" y="2810312"/>
+            <a:ext cx="1291905" cy="461394"/>
+          </a:xfrm>
+          <a:prstGeom prst="rightArrow">
+            <a:avLst/>
+          </a:prstGeom>
+        </p:spPr>
+        <p:style>
+          <a:lnRef idx="2">
+            <a:schemeClr val="accent1">
+              <a:shade val="50000"/>
+            </a:schemeClr>
+          </a:lnRef>
+          <a:fillRef idx="1">
+            <a:schemeClr val="accent1"/>
+          </a:fillRef>
+          <a:effectRef idx="0">
+            <a:schemeClr val="accent1"/>
+          </a:effectRef>
+          <a:fontRef idx="minor">
+            <a:schemeClr val="lt1"/>
+          </a:fontRef>
+        </p:style>
+        <p:txBody>
+          <a:bodyPr rtlCol="0" anchor="ctr"/>
+          <a:lstStyle/>
+          <a:p>
+            <a:pPr algn="ctr"/>
+            <a:endParaRPr lang="sv-SE"/>
+          </a:p>
+        </p:txBody>
+      </p:sp>
+      <p:sp>
+        <p:nvSpPr>
+          <p:cNvPr id="38" name="TextBox 37">
+            <a:extLst>
+              <a:ext uri="{FF2B5EF4-FFF2-40B4-BE49-F238E27FC236}">
+                <a16:creationId xmlns:a16="http://schemas.microsoft.com/office/drawing/2014/main" id="{88D32AA9-AEDC-410C-B2DA-6330D5D41387}"/>
+              </a:ext>
+            </a:extLst>
+          </p:cNvPr>
+          <p:cNvSpPr txBox="1"/>
+          <p:nvPr/>
+        </p:nvSpPr>
+        <p:spPr>
+          <a:xfrm>
+            <a:off x="9848675" y="2281849"/>
+            <a:ext cx="1191237" cy="646331"/>
+          </a:xfrm>
+          <a:prstGeom prst="rect">
+            <a:avLst/>
+          </a:prstGeom>
+          <a:noFill/>
+        </p:spPr>
+        <p:txBody>
+          <a:bodyPr wrap="square" rtlCol="0">
+            <a:spAutoFit/>
+          </a:bodyPr>
+          <a:lstStyle/>
+          <a:p>
+            <a:r>
+              <a:rPr lang="sv-SE" dirty="0" err="1"/>
+              <a:t>Suspect</a:t>
+            </a:r>
+            <a:r>
+              <a:rPr lang="sv-SE" dirty="0"/>
+              <a:t> screening</a:t>
+            </a:r>
+          </a:p>
+        </p:txBody>
+      </p:sp>
     </p:spTree>
     <p:extLst>
       <p:ext uri="{BB962C8B-B14F-4D97-AF65-F5344CB8AC3E}">
-        <p14:creationId xmlns:p14="http://schemas.microsoft.com/office/powerpoint/2010/main" val="1167131846"/>
+        <p14:creationId xmlns:p14="http://schemas.microsoft.com/office/powerpoint/2010/main" val="3617453575"/>
       </p:ext>
     </p:extLst>
   </p:cSld>
@@ -4220,7 +5055,7 @@
         <p:spPr>
           <a:xfrm>
             <a:off x="1569067" y="782032"/>
-            <a:ext cx="1070222" cy="830997"/>
+            <a:ext cx="1070222" cy="1015663"/>
           </a:xfrm>
           <a:prstGeom prst="rect">
             <a:avLst/>
@@ -4242,31 +5077,13 @@
           <a:p>
             <a:r>
               <a:rPr lang="sv-SE" sz="1200" b="1" dirty="0"/>
-              <a:t>GC-HRMS </a:t>
-            </a:r>
-            <a:r>
-              <a:rPr lang="sv-SE" sz="1200" b="1" dirty="0" err="1"/>
-              <a:t>analysis</a:t>
-            </a:r>
+              <a:t>LC-HRMS negative mode:</a:t>
+            </a:r>
+          </a:p>
+          <a:p>
             <a:r>
               <a:rPr lang="sv-SE" sz="1200" b="1" dirty="0"/>
-              <a:t> </a:t>
-            </a:r>
-            <a:r>
-              <a:rPr lang="sv-SE" sz="1200" b="1" dirty="0" err="1"/>
-              <a:t>of</a:t>
-            </a:r>
-            <a:r>
-              <a:rPr lang="sv-SE" sz="1200" b="1" dirty="0"/>
-              <a:t> </a:t>
-            </a:r>
-            <a:r>
-              <a:rPr lang="sv-SE" sz="1200" b="1" dirty="0" err="1"/>
-              <a:t>chloroatranol</a:t>
-            </a:r>
-            <a:r>
-              <a:rPr lang="sv-SE" sz="1200" b="1" dirty="0"/>
-              <a:t> standard</a:t>
+              <a:t>PFOS standard</a:t>
             </a:r>
           </a:p>
         </p:txBody>
@@ -4501,7 +5318,7 @@
         </p:blipFill>
         <p:spPr>
           <a:xfrm>
-            <a:off x="309602" y="4058558"/>
+            <a:off x="330340" y="3006145"/>
             <a:ext cx="2508146" cy="1849956"/>
           </a:xfrm>
           <a:prstGeom prst="rect">
@@ -4528,8 +5345,8 @@
         </p:nvSpPr>
         <p:spPr>
           <a:xfrm>
-            <a:off x="376833" y="4152539"/>
-            <a:ext cx="1070222" cy="830997"/>
+            <a:off x="397571" y="3100126"/>
+            <a:ext cx="1070222" cy="646331"/>
           </a:xfrm>
           <a:prstGeom prst="rect">
             <a:avLst/>
@@ -4551,23 +5368,7 @@
           <a:p>
             <a:r>
               <a:rPr lang="sv-SE" sz="1200" b="1" dirty="0"/>
-              <a:t>GC-HRMS </a:t>
-            </a:r>
-            <a:r>
-              <a:rPr lang="sv-SE" sz="1200" b="1" dirty="0" err="1"/>
-              <a:t>analysis</a:t>
-            </a:r>
-            <a:r>
-              <a:rPr lang="sv-SE" sz="1200" b="1" dirty="0"/>
-              <a:t> </a:t>
-            </a:r>
-            <a:r>
-              <a:rPr lang="sv-SE" sz="1200" b="1" dirty="0" err="1"/>
-              <a:t>of</a:t>
-            </a:r>
-            <a:r>
-              <a:rPr lang="sv-SE" sz="1200" b="1" dirty="0"/>
-              <a:t> LCM-4 standard</a:t>
+              <a:t>LC-HRMS negative mode: PFOA</a:t>
             </a:r>
           </a:p>
         </p:txBody>
@@ -4586,7 +5387,7 @@
         </p:nvSpPr>
         <p:spPr>
           <a:xfrm>
-            <a:off x="2918543" y="4727672"/>
+            <a:off x="2939281" y="3675259"/>
             <a:ext cx="570451" cy="511728"/>
           </a:xfrm>
           <a:prstGeom prst="rightArrow">
@@ -4632,16 +5433,15 @@
           </p:cNvPicPr>
           <p:nvPr/>
         </p:nvPicPr>
-        <p:blipFill>
+        <p:blipFill rotWithShape="1">
           <a:blip r:embed="rId5"/>
-          <a:stretch>
-            <a:fillRect/>
-          </a:stretch>
+          <a:srcRect b="38998"/>
+          <a:stretch/>
         </p:blipFill>
         <p:spPr>
           <a:xfrm>
-            <a:off x="3712300" y="3520974"/>
-            <a:ext cx="2075472" cy="2470800"/>
+            <a:off x="3712300" y="3144645"/>
+            <a:ext cx="2075472" cy="1507254"/>
           </a:xfrm>
           <a:prstGeom prst="rect">
             <a:avLst/>
@@ -4759,16 +5559,15 @@
           </p:cNvPicPr>
           <p:nvPr/>
         </p:nvPicPr>
-        <p:blipFill>
+        <p:blipFill rotWithShape="1">
           <a:blip r:embed="rId6"/>
-          <a:stretch>
-            <a:fillRect/>
-          </a:stretch>
+          <a:srcRect b="24976"/>
+          <a:stretch/>
         </p:blipFill>
         <p:spPr>
           <a:xfrm>
             <a:off x="6896456" y="928008"/>
-            <a:ext cx="2794664" cy="4738777"/>
+            <a:ext cx="2794664" cy="3555215"/>
           </a:xfrm>
           <a:prstGeom prst="rect">
             <a:avLst/>
@@ -4794,7 +5593,7 @@
         </p:nvSpPr>
         <p:spPr>
           <a:xfrm>
-            <a:off x="7007348" y="535345"/>
+            <a:off x="7007348" y="366068"/>
             <a:ext cx="2572879" cy="338554"/>
           </a:xfrm>
           <a:prstGeom prst="rect">
@@ -4928,7 +5727,7 @@
     </p:spTree>
     <p:extLst>
       <p:ext uri="{BB962C8B-B14F-4D97-AF65-F5344CB8AC3E}">
-        <p14:creationId xmlns:p14="http://schemas.microsoft.com/office/powerpoint/2010/main" val="3617453575"/>
+        <p14:creationId xmlns:p14="http://schemas.microsoft.com/office/powerpoint/2010/main" val="1117471798"/>
       </p:ext>
     </p:extLst>
   </p:cSld>
@@ -6238,6 +7037,352 @@
     <p:extLst>
       <p:ext uri="{BB962C8B-B14F-4D97-AF65-F5344CB8AC3E}">
         <p14:creationId xmlns:p14="http://schemas.microsoft.com/office/powerpoint/2010/main" val="2951224244"/>
+      </p:ext>
+    </p:extLst>
+  </p:cSld>
+  <p:clrMapOvr>
+    <a:masterClrMapping/>
+  </p:clrMapOvr>
+</p:sld>
+</file>
+
+<file path=ppt/slides/slide7.xml><?xml version="1.0" encoding="utf-8"?>
+<p:sld xmlns:a="http://schemas.openxmlformats.org/drawingml/2006/main" xmlns:r="http://schemas.openxmlformats.org/officeDocument/2006/relationships" xmlns:p="http://schemas.openxmlformats.org/presentationml/2006/main">
+  <p:cSld>
+    <p:spTree>
+      <p:nvGrpSpPr>
+        <p:cNvPr id="1" name=""/>
+        <p:cNvGrpSpPr/>
+        <p:nvPr/>
+      </p:nvGrpSpPr>
+      <p:grpSpPr>
+        <a:xfrm>
+          <a:off x="0" y="0"/>
+          <a:ext cx="0" cy="0"/>
+          <a:chOff x="0" y="0"/>
+          <a:chExt cx="0" cy="0"/>
+        </a:xfrm>
+      </p:grpSpPr>
+      <p:sp>
+        <p:nvSpPr>
+          <p:cNvPr id="2" name="TextBox 1">
+            <a:extLst>
+              <a:ext uri="{FF2B5EF4-FFF2-40B4-BE49-F238E27FC236}">
+                <a16:creationId xmlns:a16="http://schemas.microsoft.com/office/drawing/2014/main" id="{8B0D57E9-A609-4279-A5ED-7A3F576FC915}"/>
+              </a:ext>
+            </a:extLst>
+          </p:cNvPr>
+          <p:cNvSpPr txBox="1"/>
+          <p:nvPr/>
+        </p:nvSpPr>
+        <p:spPr>
+          <a:xfrm>
+            <a:off x="257453" y="177553"/>
+            <a:ext cx="1189608" cy="646331"/>
+          </a:xfrm>
+          <a:prstGeom prst="rect">
+            <a:avLst/>
+          </a:prstGeom>
+          <a:noFill/>
+        </p:spPr>
+        <p:txBody>
+          <a:bodyPr wrap="square" rtlCol="0">
+            <a:spAutoFit/>
+          </a:bodyPr>
+          <a:lstStyle/>
+          <a:p>
+            <a:r>
+              <a:rPr lang="sv-SE" dirty="0"/>
+              <a:t>LC-HRMS </a:t>
+            </a:r>
+            <a:r>
+              <a:rPr lang="sv-SE" dirty="0" err="1"/>
+              <a:t>spec</a:t>
+            </a:r>
+            <a:r>
+              <a:rPr lang="sv-SE" dirty="0"/>
+              <a:t> </a:t>
+            </a:r>
+            <a:r>
+              <a:rPr lang="sv-SE" dirty="0" err="1"/>
+              <a:t>lib</a:t>
+            </a:r>
+            <a:endParaRPr lang="sv-SE" dirty="0"/>
+          </a:p>
+        </p:txBody>
+      </p:sp>
+      <p:pic>
+        <p:nvPicPr>
+          <p:cNvPr id="4" name="Picture 3">
+            <a:extLst>
+              <a:ext uri="{FF2B5EF4-FFF2-40B4-BE49-F238E27FC236}">
+                <a16:creationId xmlns:a16="http://schemas.microsoft.com/office/drawing/2014/main" id="{E93AF59A-2E97-4633-A468-C75B4736913D}"/>
+              </a:ext>
+            </a:extLst>
+          </p:cNvPr>
+          <p:cNvPicPr>
+            <a:picLocks noChangeAspect="1"/>
+          </p:cNvPicPr>
+          <p:nvPr/>
+        </p:nvPicPr>
+        <p:blipFill rotWithShape="1">
+          <a:blip r:embed="rId2"/>
+          <a:srcRect l="531"/>
+          <a:stretch/>
+        </p:blipFill>
+        <p:spPr>
+          <a:xfrm>
+            <a:off x="1935332" y="528637"/>
+            <a:ext cx="8365955" cy="5800725"/>
+          </a:xfrm>
+          <a:prstGeom prst="rect">
+            <a:avLst/>
+          </a:prstGeom>
+        </p:spPr>
+      </p:pic>
+      <p:sp>
+        <p:nvSpPr>
+          <p:cNvPr id="5" name="TextBox 4">
+            <a:extLst>
+              <a:ext uri="{FF2B5EF4-FFF2-40B4-BE49-F238E27FC236}">
+                <a16:creationId xmlns:a16="http://schemas.microsoft.com/office/drawing/2014/main" id="{FE831AA4-E599-4B7A-B1E6-C5DAB4C4583B}"/>
+              </a:ext>
+            </a:extLst>
+          </p:cNvPr>
+          <p:cNvSpPr txBox="1"/>
+          <p:nvPr/>
+        </p:nvSpPr>
+        <p:spPr>
+          <a:xfrm>
+            <a:off x="6551720" y="985422"/>
+            <a:ext cx="506027" cy="369332"/>
+          </a:xfrm>
+          <a:prstGeom prst="rect">
+            <a:avLst/>
+          </a:prstGeom>
+          <a:noFill/>
+        </p:spPr>
+        <p:txBody>
+          <a:bodyPr wrap="square" rtlCol="0">
+            <a:spAutoFit/>
+          </a:bodyPr>
+          <a:lstStyle/>
+          <a:p>
+            <a:r>
+              <a:rPr lang="sv-SE" dirty="0">
+                <a:solidFill>
+                  <a:srgbClr val="FF0000"/>
+                </a:solidFill>
+              </a:rPr>
+              <a:t>1.</a:t>
+            </a:r>
+          </a:p>
+        </p:txBody>
+      </p:sp>
+      <p:sp>
+        <p:nvSpPr>
+          <p:cNvPr id="6" name="TextBox 5">
+            <a:extLst>
+              <a:ext uri="{FF2B5EF4-FFF2-40B4-BE49-F238E27FC236}">
+                <a16:creationId xmlns:a16="http://schemas.microsoft.com/office/drawing/2014/main" id="{BBA8C719-54E1-43A0-8716-66884417E97E}"/>
+              </a:ext>
+            </a:extLst>
+          </p:cNvPr>
+          <p:cNvSpPr txBox="1"/>
+          <p:nvPr/>
+        </p:nvSpPr>
+        <p:spPr>
+          <a:xfrm>
+            <a:off x="4014186" y="2447108"/>
+            <a:ext cx="506027" cy="369332"/>
+          </a:xfrm>
+          <a:prstGeom prst="rect">
+            <a:avLst/>
+          </a:prstGeom>
+          <a:noFill/>
+        </p:spPr>
+        <p:txBody>
+          <a:bodyPr wrap="square" rtlCol="0">
+            <a:spAutoFit/>
+          </a:bodyPr>
+          <a:lstStyle/>
+          <a:p>
+            <a:r>
+              <a:rPr lang="sv-SE" dirty="0">
+                <a:solidFill>
+                  <a:srgbClr val="FF0000"/>
+                </a:solidFill>
+              </a:rPr>
+              <a:t>2.</a:t>
+            </a:r>
+          </a:p>
+        </p:txBody>
+      </p:sp>
+      <p:cxnSp>
+        <p:nvCxnSpPr>
+          <p:cNvPr id="8" name="Straight Arrow Connector 7">
+            <a:extLst>
+              <a:ext uri="{FF2B5EF4-FFF2-40B4-BE49-F238E27FC236}">
+                <a16:creationId xmlns:a16="http://schemas.microsoft.com/office/drawing/2014/main" id="{037F34B6-7806-4A63-825A-C6B333C1436F}"/>
+              </a:ext>
+            </a:extLst>
+          </p:cNvPr>
+          <p:cNvCxnSpPr>
+            <a:cxnSpLocks/>
+          </p:cNvCxnSpPr>
+          <p:nvPr/>
+        </p:nvCxnSpPr>
+        <p:spPr>
+          <a:xfrm flipH="1" flipV="1">
+            <a:off x="3116062" y="1677880"/>
+            <a:ext cx="898124" cy="976543"/>
+          </a:xfrm>
+          <a:prstGeom prst="straightConnector1">
+            <a:avLst/>
+          </a:prstGeom>
+          <a:ln>
+            <a:tailEnd type="triangle"/>
+          </a:ln>
+        </p:spPr>
+        <p:style>
+          <a:lnRef idx="1">
+            <a:schemeClr val="accent1"/>
+          </a:lnRef>
+          <a:fillRef idx="0">
+            <a:schemeClr val="accent1"/>
+          </a:fillRef>
+          <a:effectRef idx="0">
+            <a:schemeClr val="accent1"/>
+          </a:effectRef>
+          <a:fontRef idx="minor">
+            <a:schemeClr val="tx1"/>
+          </a:fontRef>
+        </p:style>
+      </p:cxnSp>
+      <p:cxnSp>
+        <p:nvCxnSpPr>
+          <p:cNvPr id="11" name="Straight Arrow Connector 10">
+            <a:extLst>
+              <a:ext uri="{FF2B5EF4-FFF2-40B4-BE49-F238E27FC236}">
+                <a16:creationId xmlns:a16="http://schemas.microsoft.com/office/drawing/2014/main" id="{BE95005F-414D-4723-AF56-53BDAC43BF80}"/>
+              </a:ext>
+            </a:extLst>
+          </p:cNvPr>
+          <p:cNvCxnSpPr>
+            <a:cxnSpLocks/>
+            <a:stCxn id="6" idx="2"/>
+          </p:cNvCxnSpPr>
+          <p:nvPr/>
+        </p:nvCxnSpPr>
+        <p:spPr>
+          <a:xfrm>
+            <a:off x="4267200" y="2816440"/>
+            <a:ext cx="127247" cy="612560"/>
+          </a:xfrm>
+          <a:prstGeom prst="straightConnector1">
+            <a:avLst/>
+          </a:prstGeom>
+          <a:ln>
+            <a:tailEnd type="triangle"/>
+          </a:ln>
+        </p:spPr>
+        <p:style>
+          <a:lnRef idx="1">
+            <a:schemeClr val="accent1"/>
+          </a:lnRef>
+          <a:fillRef idx="0">
+            <a:schemeClr val="accent1"/>
+          </a:fillRef>
+          <a:effectRef idx="0">
+            <a:schemeClr val="accent1"/>
+          </a:effectRef>
+          <a:fontRef idx="minor">
+            <a:schemeClr val="tx1"/>
+          </a:fontRef>
+        </p:style>
+      </p:cxnSp>
+      <p:sp>
+        <p:nvSpPr>
+          <p:cNvPr id="15" name="TextBox 14">
+            <a:extLst>
+              <a:ext uri="{FF2B5EF4-FFF2-40B4-BE49-F238E27FC236}">
+                <a16:creationId xmlns:a16="http://schemas.microsoft.com/office/drawing/2014/main" id="{928D0C65-6B6A-4A4F-975C-811E41098CCE}"/>
+              </a:ext>
+            </a:extLst>
+          </p:cNvPr>
+          <p:cNvSpPr txBox="1"/>
+          <p:nvPr/>
+        </p:nvSpPr>
+        <p:spPr>
+          <a:xfrm>
+            <a:off x="8463378" y="1731146"/>
+            <a:ext cx="506027" cy="369332"/>
+          </a:xfrm>
+          <a:prstGeom prst="rect">
+            <a:avLst/>
+          </a:prstGeom>
+          <a:noFill/>
+        </p:spPr>
+        <p:txBody>
+          <a:bodyPr wrap="square" rtlCol="0">
+            <a:spAutoFit/>
+          </a:bodyPr>
+          <a:lstStyle/>
+          <a:p>
+            <a:r>
+              <a:rPr lang="sv-SE" dirty="0">
+                <a:solidFill>
+                  <a:srgbClr val="FF0000"/>
+                </a:solidFill>
+              </a:rPr>
+              <a:t>3.</a:t>
+            </a:r>
+          </a:p>
+        </p:txBody>
+      </p:sp>
+      <p:sp>
+        <p:nvSpPr>
+          <p:cNvPr id="16" name="TextBox 15">
+            <a:extLst>
+              <a:ext uri="{FF2B5EF4-FFF2-40B4-BE49-F238E27FC236}">
+                <a16:creationId xmlns:a16="http://schemas.microsoft.com/office/drawing/2014/main" id="{F8701766-CDE9-46AD-BF51-ED2C3E5FC421}"/>
+              </a:ext>
+            </a:extLst>
+          </p:cNvPr>
+          <p:cNvSpPr txBox="1"/>
+          <p:nvPr/>
+        </p:nvSpPr>
+        <p:spPr>
+          <a:xfrm>
+            <a:off x="7506068" y="5968908"/>
+            <a:ext cx="506027" cy="369332"/>
+          </a:xfrm>
+          <a:prstGeom prst="rect">
+            <a:avLst/>
+          </a:prstGeom>
+          <a:noFill/>
+        </p:spPr>
+        <p:txBody>
+          <a:bodyPr wrap="square" rtlCol="0">
+            <a:spAutoFit/>
+          </a:bodyPr>
+          <a:lstStyle/>
+          <a:p>
+            <a:r>
+              <a:rPr lang="sv-SE" dirty="0">
+                <a:solidFill>
+                  <a:srgbClr val="FF0000"/>
+                </a:solidFill>
+              </a:rPr>
+              <a:t>4.</a:t>
+            </a:r>
+          </a:p>
+        </p:txBody>
+      </p:sp>
+    </p:spTree>
+    <p:extLst>
+      <p:ext uri="{BB962C8B-B14F-4D97-AF65-F5344CB8AC3E}">
+        <p14:creationId xmlns:p14="http://schemas.microsoft.com/office/powerpoint/2010/main" val="1167131846"/>
       </p:ext>
     </p:extLst>
   </p:cSld>

</xml_diff>